<commit_message>
Changes to multiple files
</commit_message>
<xml_diff>
--- a/sampexlib/Concept Summaries/LASP Research Summary.pptx
+++ b/sampexlib/Concept Summaries/LASP Research Summary.pptx
@@ -6,12 +6,15 @@
   </p:sldMasterIdLst>
   <p:sldIdLst>
     <p:sldId id="256" r:id="rId2"/>
-    <p:sldId id="257" r:id="rId3"/>
-    <p:sldId id="258" r:id="rId4"/>
-    <p:sldId id="259" r:id="rId5"/>
-    <p:sldId id="262" r:id="rId6"/>
-    <p:sldId id="260" r:id="rId7"/>
-    <p:sldId id="261" r:id="rId8"/>
+    <p:sldId id="263" r:id="rId3"/>
+    <p:sldId id="264" r:id="rId4"/>
+    <p:sldId id="265" r:id="rId5"/>
+    <p:sldId id="257" r:id="rId6"/>
+    <p:sldId id="258" r:id="rId7"/>
+    <p:sldId id="259" r:id="rId8"/>
+    <p:sldId id="262" r:id="rId9"/>
+    <p:sldId id="260" r:id="rId10"/>
+    <p:sldId id="261" r:id="rId11"/>
   </p:sldIdLst>
   <p:sldSz cx="12192000" cy="6858000"/>
   <p:notesSz cx="6858000" cy="9144000"/>
@@ -265,7 +268,7 @@
           <a:p>
             <a:fld id="{4E9E4D5A-70D9-49DB-B396-8E67F4DFB91A}" type="datetimeFigureOut">
               <a:rPr lang="en-US" smtClean="0"/>
-              <a:t>6/2/2021</a:t>
+              <a:t>9/8/2021</a:t>
             </a:fld>
             <a:endParaRPr lang="en-US"/>
           </a:p>
@@ -463,7 +466,7 @@
           <a:p>
             <a:fld id="{4E9E4D5A-70D9-49DB-B396-8E67F4DFB91A}" type="datetimeFigureOut">
               <a:rPr lang="en-US" smtClean="0"/>
-              <a:t>6/2/2021</a:t>
+              <a:t>9/8/2021</a:t>
             </a:fld>
             <a:endParaRPr lang="en-US"/>
           </a:p>
@@ -671,7 +674,7 @@
           <a:p>
             <a:fld id="{4E9E4D5A-70D9-49DB-B396-8E67F4DFB91A}" type="datetimeFigureOut">
               <a:rPr lang="en-US" smtClean="0"/>
-              <a:t>6/2/2021</a:t>
+              <a:t>9/8/2021</a:t>
             </a:fld>
             <a:endParaRPr lang="en-US"/>
           </a:p>
@@ -869,7 +872,7 @@
           <a:p>
             <a:fld id="{4E9E4D5A-70D9-49DB-B396-8E67F4DFB91A}" type="datetimeFigureOut">
               <a:rPr lang="en-US" smtClean="0"/>
-              <a:t>6/2/2021</a:t>
+              <a:t>9/8/2021</a:t>
             </a:fld>
             <a:endParaRPr lang="en-US"/>
           </a:p>
@@ -1144,7 +1147,7 @@
           <a:p>
             <a:fld id="{4E9E4D5A-70D9-49DB-B396-8E67F4DFB91A}" type="datetimeFigureOut">
               <a:rPr lang="en-US" smtClean="0"/>
-              <a:t>6/2/2021</a:t>
+              <a:t>9/8/2021</a:t>
             </a:fld>
             <a:endParaRPr lang="en-US"/>
           </a:p>
@@ -1409,7 +1412,7 @@
           <a:p>
             <a:fld id="{4E9E4D5A-70D9-49DB-B396-8E67F4DFB91A}" type="datetimeFigureOut">
               <a:rPr lang="en-US" smtClean="0"/>
-              <a:t>6/2/2021</a:t>
+              <a:t>9/8/2021</a:t>
             </a:fld>
             <a:endParaRPr lang="en-US"/>
           </a:p>
@@ -1821,7 +1824,7 @@
           <a:p>
             <a:fld id="{4E9E4D5A-70D9-49DB-B396-8E67F4DFB91A}" type="datetimeFigureOut">
               <a:rPr lang="en-US" smtClean="0"/>
-              <a:t>6/2/2021</a:t>
+              <a:t>9/8/2021</a:t>
             </a:fld>
             <a:endParaRPr lang="en-US"/>
           </a:p>
@@ -1962,7 +1965,7 @@
           <a:p>
             <a:fld id="{4E9E4D5A-70D9-49DB-B396-8E67F4DFB91A}" type="datetimeFigureOut">
               <a:rPr lang="en-US" smtClean="0"/>
-              <a:t>6/2/2021</a:t>
+              <a:t>9/8/2021</a:t>
             </a:fld>
             <a:endParaRPr lang="en-US"/>
           </a:p>
@@ -2075,7 +2078,7 @@
           <a:p>
             <a:fld id="{4E9E4D5A-70D9-49DB-B396-8E67F4DFB91A}" type="datetimeFigureOut">
               <a:rPr lang="en-US" smtClean="0"/>
-              <a:t>6/2/2021</a:t>
+              <a:t>9/8/2021</a:t>
             </a:fld>
             <a:endParaRPr lang="en-US"/>
           </a:p>
@@ -2386,7 +2389,7 @@
           <a:p>
             <a:fld id="{4E9E4D5A-70D9-49DB-B396-8E67F4DFB91A}" type="datetimeFigureOut">
               <a:rPr lang="en-US" smtClean="0"/>
-              <a:t>6/2/2021</a:t>
+              <a:t>9/8/2021</a:t>
             </a:fld>
             <a:endParaRPr lang="en-US"/>
           </a:p>
@@ -2674,7 +2677,7 @@
           <a:p>
             <a:fld id="{4E9E4D5A-70D9-49DB-B396-8E67F4DFB91A}" type="datetimeFigureOut">
               <a:rPr lang="en-US" smtClean="0"/>
-              <a:t>6/2/2021</a:t>
+              <a:t>9/8/2021</a:t>
             </a:fld>
             <a:endParaRPr lang="en-US"/>
           </a:p>
@@ -2915,7 +2918,7 @@
           <a:p>
             <a:fld id="{4E9E4D5A-70D9-49DB-B396-8E67F4DFB91A}" type="datetimeFigureOut">
               <a:rPr lang="en-US" smtClean="0"/>
-              <a:t>6/2/2021</a:t>
+              <a:t>9/8/2021</a:t>
             </a:fld>
             <a:endParaRPr lang="en-US"/>
           </a:p>
@@ -3360,31 +3363,6 @@
           </a:p>
         </p:txBody>
       </p:sp>
-      <p:sp>
-        <p:nvSpPr>
-          <p:cNvPr id="3" name="Subtitle 2">
-            <a:extLst>
-              <a:ext uri="{FF2B5EF4-FFF2-40B4-BE49-F238E27FC236}">
-                <a16:creationId xmlns:a16="http://schemas.microsoft.com/office/drawing/2014/main" id="{7DE7A921-5781-4BF7-86EA-78B041EFF489}"/>
-              </a:ext>
-            </a:extLst>
-          </p:cNvPr>
-          <p:cNvSpPr>
-            <a:spLocks noGrp="1"/>
-          </p:cNvSpPr>
-          <p:nvPr>
-            <p:ph type="subTitle" idx="1"/>
-          </p:nvPr>
-        </p:nvSpPr>
-        <p:spPr/>
-        <p:txBody>
-          <a:bodyPr/>
-          <a:lstStyle/>
-          <a:p>
-            <a:endParaRPr lang="en-US"/>
-          </a:p>
-        </p:txBody>
-      </p:sp>
     </p:spTree>
     <p:extLst>
       <p:ext uri="{BB962C8B-B14F-4D97-AF65-F5344CB8AC3E}">
@@ -3398,7 +3376,1096 @@
 </p:sld>
 </file>
 
+<file path=ppt/slides/slide10.xml><?xml version="1.0" encoding="utf-8"?>
+<p:sld xmlns:a="http://schemas.openxmlformats.org/drawingml/2006/main" xmlns:r="http://schemas.openxmlformats.org/officeDocument/2006/relationships" xmlns:p="http://schemas.openxmlformats.org/presentationml/2006/main">
+  <p:cSld>
+    <p:spTree>
+      <p:nvGrpSpPr>
+        <p:cNvPr id="1" name=""/>
+        <p:cNvGrpSpPr/>
+        <p:nvPr/>
+      </p:nvGrpSpPr>
+      <p:grpSpPr>
+        <a:xfrm>
+          <a:off x="0" y="0"/>
+          <a:ext cx="0" cy="0"/>
+          <a:chOff x="0" y="0"/>
+          <a:chExt cx="0" cy="0"/>
+        </a:xfrm>
+      </p:grpSpPr>
+      <p:sp>
+        <p:nvSpPr>
+          <p:cNvPr id="4" name="Title 1">
+            <a:extLst>
+              <a:ext uri="{FF2B5EF4-FFF2-40B4-BE49-F238E27FC236}">
+                <a16:creationId xmlns:a16="http://schemas.microsoft.com/office/drawing/2014/main" id="{3835412D-5D74-40CD-AE73-A55A23B5A6CA}"/>
+              </a:ext>
+            </a:extLst>
+          </p:cNvPr>
+          <p:cNvSpPr>
+            <a:spLocks noGrp="1"/>
+          </p:cNvSpPr>
+          <p:nvPr>
+            <p:ph type="title"/>
+          </p:nvPr>
+        </p:nvSpPr>
+        <p:spPr>
+          <a:xfrm>
+            <a:off x="52873" y="386038"/>
+            <a:ext cx="12139127" cy="1325563"/>
+          </a:xfrm>
+        </p:spPr>
+        <p:txBody>
+          <a:bodyPr/>
+          <a:lstStyle/>
+          <a:p>
+            <a:r>
+              <a:rPr lang="en-US" dirty="0"/>
+              <a:t>Microburst Occurrences vs Magnetic Indices (cont’d)</a:t>
+            </a:r>
+          </a:p>
+        </p:txBody>
+      </p:sp>
+      <p:pic>
+        <p:nvPicPr>
+          <p:cNvPr id="5122" name="Picture 2">
+            <a:extLst>
+              <a:ext uri="{FF2B5EF4-FFF2-40B4-BE49-F238E27FC236}">
+                <a16:creationId xmlns:a16="http://schemas.microsoft.com/office/drawing/2014/main" id="{A04A2056-C968-46E5-9E1C-3FC54CEA06EE}"/>
+              </a:ext>
+            </a:extLst>
+          </p:cNvPr>
+          <p:cNvPicPr>
+            <a:picLocks noChangeAspect="1" noChangeArrowheads="1"/>
+          </p:cNvPicPr>
+          <p:nvPr/>
+        </p:nvPicPr>
+        <p:blipFill>
+          <a:blip r:embed="rId2">
+            <a:extLst>
+              <a:ext uri="{28A0092B-C50C-407E-A947-70E740481C1C}">
+                <a14:useLocalDpi xmlns:a14="http://schemas.microsoft.com/office/drawing/2010/main" val="0"/>
+              </a:ext>
+            </a:extLst>
+          </a:blip>
+          <a:srcRect/>
+          <a:stretch>
+            <a:fillRect/>
+          </a:stretch>
+        </p:blipFill>
+        <p:spPr bwMode="auto">
+          <a:xfrm>
+            <a:off x="2373681" y="1498606"/>
+            <a:ext cx="7118960" cy="2596381"/>
+          </a:xfrm>
+          <a:prstGeom prst="rect">
+            <a:avLst/>
+          </a:prstGeom>
+          <a:noFill/>
+          <a:extLst>
+            <a:ext uri="{909E8E84-426E-40DD-AFC4-6F175D3DCCD1}">
+              <a14:hiddenFill xmlns:a14="http://schemas.microsoft.com/office/drawing/2010/main">
+                <a:solidFill>
+                  <a:srgbClr val="FFFFFF"/>
+                </a:solidFill>
+              </a14:hiddenFill>
+            </a:ext>
+          </a:extLst>
+        </p:spPr>
+      </p:pic>
+      <p:pic>
+        <p:nvPicPr>
+          <p:cNvPr id="5124" name="Picture 4">
+            <a:extLst>
+              <a:ext uri="{FF2B5EF4-FFF2-40B4-BE49-F238E27FC236}">
+                <a16:creationId xmlns:a16="http://schemas.microsoft.com/office/drawing/2014/main" id="{F83D4E49-10DA-45C9-B97F-13E602EBFB15}"/>
+              </a:ext>
+            </a:extLst>
+          </p:cNvPr>
+          <p:cNvPicPr>
+            <a:picLocks noChangeAspect="1" noChangeArrowheads="1"/>
+          </p:cNvPicPr>
+          <p:nvPr/>
+        </p:nvPicPr>
+        <p:blipFill>
+          <a:blip r:embed="rId3">
+            <a:extLst>
+              <a:ext uri="{28A0092B-C50C-407E-A947-70E740481C1C}">
+                <a14:useLocalDpi xmlns:a14="http://schemas.microsoft.com/office/drawing/2010/main" val="0"/>
+              </a:ext>
+            </a:extLst>
+          </a:blip>
+          <a:srcRect/>
+          <a:stretch>
+            <a:fillRect/>
+          </a:stretch>
+        </p:blipFill>
+        <p:spPr bwMode="auto">
+          <a:xfrm>
+            <a:off x="2373680" y="4094987"/>
+            <a:ext cx="7118961" cy="2596381"/>
+          </a:xfrm>
+          <a:prstGeom prst="rect">
+            <a:avLst/>
+          </a:prstGeom>
+          <a:noFill/>
+          <a:extLst>
+            <a:ext uri="{909E8E84-426E-40DD-AFC4-6F175D3DCCD1}">
+              <a14:hiddenFill xmlns:a14="http://schemas.microsoft.com/office/drawing/2010/main">
+                <a:solidFill>
+                  <a:srgbClr val="FFFFFF"/>
+                </a:solidFill>
+              </a14:hiddenFill>
+            </a:ext>
+          </a:extLst>
+        </p:spPr>
+      </p:pic>
+    </p:spTree>
+    <p:extLst>
+      <p:ext uri="{BB962C8B-B14F-4D97-AF65-F5344CB8AC3E}">
+        <p14:creationId xmlns:p14="http://schemas.microsoft.com/office/powerpoint/2010/main" val="1084330929"/>
+      </p:ext>
+    </p:extLst>
+  </p:cSld>
+  <p:clrMapOvr>
+    <a:masterClrMapping/>
+  </p:clrMapOvr>
+</p:sld>
+</file>
+
 <file path=ppt/slides/slide2.xml><?xml version="1.0" encoding="utf-8"?>
+<p:sld xmlns:a="http://schemas.openxmlformats.org/drawingml/2006/main" xmlns:r="http://schemas.openxmlformats.org/officeDocument/2006/relationships" xmlns:p="http://schemas.openxmlformats.org/presentationml/2006/main">
+  <p:cSld>
+    <p:spTree>
+      <p:nvGrpSpPr>
+        <p:cNvPr id="1" name=""/>
+        <p:cNvGrpSpPr/>
+        <p:nvPr/>
+      </p:nvGrpSpPr>
+      <p:grpSpPr>
+        <a:xfrm>
+          <a:off x="0" y="0"/>
+          <a:ext cx="0" cy="0"/>
+          <a:chOff x="0" y="0"/>
+          <a:chExt cx="0" cy="0"/>
+        </a:xfrm>
+      </p:grpSpPr>
+      <p:pic>
+        <p:nvPicPr>
+          <p:cNvPr id="16" name="Picture 15" descr="A picture containing compact disk, electronics&#10;&#10;Description automatically generated">
+            <a:extLst>
+              <a:ext uri="{FF2B5EF4-FFF2-40B4-BE49-F238E27FC236}">
+                <a16:creationId xmlns:a16="http://schemas.microsoft.com/office/drawing/2014/main" id="{0AB513A7-9B32-40D5-B7FB-71893C42F1CA}"/>
+              </a:ext>
+            </a:extLst>
+          </p:cNvPr>
+          <p:cNvPicPr>
+            <a:picLocks noChangeAspect="1"/>
+          </p:cNvPicPr>
+          <p:nvPr/>
+        </p:nvPicPr>
+        <p:blipFill>
+          <a:blip r:embed="rId2">
+            <a:extLst>
+              <a:ext uri="{28A0092B-C50C-407E-A947-70E740481C1C}">
+                <a14:useLocalDpi xmlns:a14="http://schemas.microsoft.com/office/drawing/2010/main" val="0"/>
+              </a:ext>
+            </a:extLst>
+          </a:blip>
+          <a:stretch>
+            <a:fillRect/>
+          </a:stretch>
+        </p:blipFill>
+        <p:spPr>
+          <a:xfrm>
+            <a:off x="5991439" y="3092369"/>
+            <a:ext cx="6094350" cy="3428072"/>
+          </a:xfrm>
+          <a:prstGeom prst="rect">
+            <a:avLst/>
+          </a:prstGeom>
+        </p:spPr>
+      </p:pic>
+      <p:sp>
+        <p:nvSpPr>
+          <p:cNvPr id="2" name="Title 1">
+            <a:extLst>
+              <a:ext uri="{FF2B5EF4-FFF2-40B4-BE49-F238E27FC236}">
+                <a16:creationId xmlns:a16="http://schemas.microsoft.com/office/drawing/2014/main" id="{65D9F104-4356-4013-9A24-3E83247BFF9D}"/>
+              </a:ext>
+            </a:extLst>
+          </p:cNvPr>
+          <p:cNvSpPr>
+            <a:spLocks noGrp="1"/>
+          </p:cNvSpPr>
+          <p:nvPr>
+            <p:ph type="title"/>
+          </p:nvPr>
+        </p:nvSpPr>
+        <p:spPr>
+          <a:xfrm>
+            <a:off x="527480" y="20275"/>
+            <a:ext cx="10515600" cy="1325563"/>
+          </a:xfrm>
+        </p:spPr>
+        <p:txBody>
+          <a:bodyPr/>
+          <a:lstStyle/>
+          <a:p>
+            <a:r>
+              <a:rPr lang="en-US" dirty="0"/>
+              <a:t>Science Background</a:t>
+            </a:r>
+          </a:p>
+        </p:txBody>
+      </p:sp>
+      <p:pic>
+        <p:nvPicPr>
+          <p:cNvPr id="5" name="Content Placeholder 4" descr="Diagram&#10;&#10;Description automatically generated">
+            <a:extLst>
+              <a:ext uri="{FF2B5EF4-FFF2-40B4-BE49-F238E27FC236}">
+                <a16:creationId xmlns:a16="http://schemas.microsoft.com/office/drawing/2014/main" id="{EB4EF867-3209-410F-8886-9E18FA30AED4}"/>
+              </a:ext>
+            </a:extLst>
+          </p:cNvPr>
+          <p:cNvPicPr>
+            <a:picLocks noGrp="1" noChangeAspect="1"/>
+          </p:cNvPicPr>
+          <p:nvPr>
+            <p:ph idx="1"/>
+          </p:nvPr>
+        </p:nvPicPr>
+        <p:blipFill>
+          <a:blip r:embed="rId3">
+            <a:extLst>
+              <a:ext uri="{28A0092B-C50C-407E-A947-70E740481C1C}">
+                <a14:useLocalDpi xmlns:a14="http://schemas.microsoft.com/office/drawing/2010/main" val="0"/>
+              </a:ext>
+            </a:extLst>
+          </a:blip>
+          <a:stretch>
+            <a:fillRect/>
+          </a:stretch>
+        </p:blipFill>
+        <p:spPr>
+          <a:xfrm>
+            <a:off x="9927709" y="4924329"/>
+            <a:ext cx="2058838" cy="1444259"/>
+          </a:xfrm>
+          <a:ln w="28575">
+            <a:solidFill>
+              <a:schemeClr val="tx1"/>
+            </a:solidFill>
+          </a:ln>
+        </p:spPr>
+      </p:pic>
+      <p:grpSp>
+        <p:nvGrpSpPr>
+          <p:cNvPr id="6" name="Group 5">
+            <a:extLst>
+              <a:ext uri="{FF2B5EF4-FFF2-40B4-BE49-F238E27FC236}">
+                <a16:creationId xmlns:a16="http://schemas.microsoft.com/office/drawing/2014/main" id="{BC478F4E-7B40-46A3-B17F-3E95FFDD556C}"/>
+              </a:ext>
+            </a:extLst>
+          </p:cNvPr>
+          <p:cNvGrpSpPr/>
+          <p:nvPr/>
+        </p:nvGrpSpPr>
+        <p:grpSpPr>
+          <a:xfrm>
+            <a:off x="6684886" y="408222"/>
+            <a:ext cx="5640280" cy="2684147"/>
+            <a:chOff x="2316648" y="1600200"/>
+            <a:chExt cx="6777016" cy="3375181"/>
+          </a:xfrm>
+        </p:grpSpPr>
+        <p:pic>
+          <p:nvPicPr>
+            <p:cNvPr id="7" name="Picture 6" descr="JSample Thesis UCB 2013.pdf">
+              <a:extLst>
+                <a:ext uri="{FF2B5EF4-FFF2-40B4-BE49-F238E27FC236}">
+                  <a16:creationId xmlns:a16="http://schemas.microsoft.com/office/drawing/2014/main" id="{962670AD-96CB-4506-BFF7-8C5F85AC4367}"/>
+                </a:ext>
+              </a:extLst>
+            </p:cNvPr>
+            <p:cNvPicPr>
+              <a:picLocks noChangeAspect="1"/>
+            </p:cNvPicPr>
+            <p:nvPr/>
+          </p:nvPicPr>
+          <p:blipFill>
+            <a:blip r:embed="rId4">
+              <a:extLst>
+                <a:ext uri="{28A0092B-C50C-407E-A947-70E740481C1C}">
+                  <a14:useLocalDpi xmlns:a14="http://schemas.microsoft.com/office/drawing/2010/main"/>
+                </a:ext>
+              </a:extLst>
+            </a:blip>
+            <a:srcRect l="20254" t="61792" r="19643" b="15206"/>
+            <a:stretch>
+              <a:fillRect/>
+            </a:stretch>
+          </p:blipFill>
+          <p:spPr>
+            <a:xfrm>
+              <a:off x="2316648" y="1600200"/>
+              <a:ext cx="6370152" cy="3154935"/>
+            </a:xfrm>
+            <a:prstGeom prst="rect">
+              <a:avLst/>
+            </a:prstGeom>
+            <a:ln>
+              <a:solidFill>
+                <a:schemeClr val="tx1"/>
+              </a:solidFill>
+            </a:ln>
+          </p:spPr>
+        </p:pic>
+        <p:sp>
+          <p:nvSpPr>
+            <p:cNvPr id="8" name="TextBox 7">
+              <a:extLst>
+                <a:ext uri="{FF2B5EF4-FFF2-40B4-BE49-F238E27FC236}">
+                  <a16:creationId xmlns:a16="http://schemas.microsoft.com/office/drawing/2014/main" id="{951B5A75-5FD4-43DE-8CC7-DFAB6CB96860}"/>
+                </a:ext>
+              </a:extLst>
+            </p:cNvPr>
+            <p:cNvSpPr txBox="1">
+              <a:spLocks noChangeArrowheads="1"/>
+            </p:cNvSpPr>
+            <p:nvPr/>
+          </p:nvSpPr>
+          <p:spPr bwMode="auto">
+            <a:xfrm>
+              <a:off x="6954137" y="4711211"/>
+              <a:ext cx="2139527" cy="264170"/>
+            </a:xfrm>
+            <a:prstGeom prst="rect">
+              <a:avLst/>
+            </a:prstGeom>
+            <a:noFill/>
+            <a:ln w="9525">
+              <a:noFill/>
+              <a:miter lim="800000"/>
+              <a:headEnd/>
+              <a:tailEnd/>
+            </a:ln>
+          </p:spPr>
+          <p:txBody>
+            <a:bodyPr wrap="square">
+              <a:prstTxWarp prst="textNoShape">
+                <a:avLst/>
+              </a:prstTxWarp>
+              <a:spAutoFit/>
+            </a:bodyPr>
+            <a:lstStyle/>
+            <a:p>
+              <a:r>
+                <a:rPr lang="en-US" sz="1000" dirty="0">
+                  <a:solidFill>
+                    <a:srgbClr val="404040"/>
+                  </a:solidFill>
+                  <a:latin typeface="Optima"/>
+                  <a:cs typeface="Optima"/>
+                </a:rPr>
+                <a:t>J. Sample, PhD Thesis (2013)</a:t>
+              </a:r>
+            </a:p>
+          </p:txBody>
+        </p:sp>
+      </p:grpSp>
+      <p:sp>
+        <p:nvSpPr>
+          <p:cNvPr id="10" name="TextBox 9">
+            <a:extLst>
+              <a:ext uri="{FF2B5EF4-FFF2-40B4-BE49-F238E27FC236}">
+                <a16:creationId xmlns:a16="http://schemas.microsoft.com/office/drawing/2014/main" id="{4A0D5F09-9C11-4542-9FE1-365EB89DA488}"/>
+              </a:ext>
+            </a:extLst>
+          </p:cNvPr>
+          <p:cNvSpPr txBox="1"/>
+          <p:nvPr/>
+        </p:nvSpPr>
+        <p:spPr>
+          <a:xfrm>
+            <a:off x="10669900" y="6315301"/>
+            <a:ext cx="1529875" cy="246221"/>
+          </a:xfrm>
+          <a:prstGeom prst="rect">
+            <a:avLst/>
+          </a:prstGeom>
+          <a:noFill/>
+        </p:spPr>
+        <p:txBody>
+          <a:bodyPr wrap="square">
+            <a:spAutoFit/>
+          </a:bodyPr>
+          <a:lstStyle/>
+          <a:p>
+            <a:r>
+              <a:rPr lang="en-US" sz="1000" dirty="0">
+                <a:solidFill>
+                  <a:schemeClr val="bg1"/>
+                </a:solidFill>
+              </a:rPr>
+              <a:t>(From Yuting Ng, 2013)</a:t>
+            </a:r>
+          </a:p>
+        </p:txBody>
+      </p:sp>
+      <p:pic>
+        <p:nvPicPr>
+          <p:cNvPr id="14" name="Picture 13">
+            <a:extLst>
+              <a:ext uri="{FF2B5EF4-FFF2-40B4-BE49-F238E27FC236}">
+                <a16:creationId xmlns:a16="http://schemas.microsoft.com/office/drawing/2014/main" id="{D06D677A-7719-4A54-BE47-C599081BFB5C}"/>
+              </a:ext>
+            </a:extLst>
+          </p:cNvPr>
+          <p:cNvPicPr>
+            <a:picLocks noChangeAspect="1"/>
+          </p:cNvPicPr>
+          <p:nvPr/>
+        </p:nvPicPr>
+        <p:blipFill rotWithShape="1">
+          <a:blip r:embed="rId5"/>
+          <a:srcRect/>
+          <a:stretch/>
+        </p:blipFill>
+        <p:spPr>
+          <a:xfrm>
+            <a:off x="1033508" y="4080187"/>
+            <a:ext cx="3849210" cy="2440254"/>
+          </a:xfrm>
+          <a:prstGeom prst="rect">
+            <a:avLst/>
+          </a:prstGeom>
+          <a:ln w="28575">
+            <a:solidFill>
+              <a:schemeClr val="tx1"/>
+            </a:solidFill>
+          </a:ln>
+        </p:spPr>
+      </p:pic>
+      <p:sp>
+        <p:nvSpPr>
+          <p:cNvPr id="17" name="TextBox 16">
+            <a:extLst>
+              <a:ext uri="{FF2B5EF4-FFF2-40B4-BE49-F238E27FC236}">
+                <a16:creationId xmlns:a16="http://schemas.microsoft.com/office/drawing/2014/main" id="{1EDF7C88-3186-429E-B7DA-317086838DF6}"/>
+              </a:ext>
+            </a:extLst>
+          </p:cNvPr>
+          <p:cNvSpPr txBox="1"/>
+          <p:nvPr/>
+        </p:nvSpPr>
+        <p:spPr>
+          <a:xfrm>
+            <a:off x="10947510" y="6484304"/>
+            <a:ext cx="1529875" cy="246221"/>
+          </a:xfrm>
+          <a:prstGeom prst="rect">
+            <a:avLst/>
+          </a:prstGeom>
+          <a:noFill/>
+        </p:spPr>
+        <p:txBody>
+          <a:bodyPr wrap="square">
+            <a:spAutoFit/>
+          </a:bodyPr>
+          <a:lstStyle/>
+          <a:p>
+            <a:r>
+              <a:rPr lang="en-US" sz="1000" dirty="0"/>
+              <a:t>(From Wikipedia)</a:t>
+            </a:r>
+          </a:p>
+        </p:txBody>
+      </p:sp>
+      <p:sp>
+        <p:nvSpPr>
+          <p:cNvPr id="18" name="TextBox 17">
+            <a:extLst>
+              <a:ext uri="{FF2B5EF4-FFF2-40B4-BE49-F238E27FC236}">
+                <a16:creationId xmlns:a16="http://schemas.microsoft.com/office/drawing/2014/main" id="{76ECA605-F1B8-453A-9B57-CB627D2A47AF}"/>
+              </a:ext>
+            </a:extLst>
+          </p:cNvPr>
+          <p:cNvSpPr txBox="1"/>
+          <p:nvPr/>
+        </p:nvSpPr>
+        <p:spPr>
+          <a:xfrm>
+            <a:off x="757185" y="1060501"/>
+            <a:ext cx="5234254" cy="2677656"/>
+          </a:xfrm>
+          <a:prstGeom prst="rect">
+            <a:avLst/>
+          </a:prstGeom>
+          <a:noFill/>
+        </p:spPr>
+        <p:txBody>
+          <a:bodyPr wrap="square">
+            <a:spAutoFit/>
+          </a:bodyPr>
+          <a:lstStyle/>
+          <a:p>
+            <a:pPr marL="285750" indent="-285750">
+              <a:buFont typeface="Arial" panose="020B0604020202020204" pitchFamily="34" charset="0"/>
+              <a:buChar char="•"/>
+            </a:pPr>
+            <a:r>
+              <a:rPr lang="en-US" sz="1400" dirty="0"/>
+              <a:t>The Earth’s radiation belts are composed of electrons interacting with the planetary magnetic field in 3 main motions:</a:t>
+            </a:r>
+          </a:p>
+          <a:p>
+            <a:pPr marL="800100" lvl="1" indent="-342900">
+              <a:buAutoNum type="arabicParenR"/>
+            </a:pPr>
+            <a:r>
+              <a:rPr lang="en-US" sz="1400" dirty="0"/>
+              <a:t>Gyro motion</a:t>
+            </a:r>
+          </a:p>
+          <a:p>
+            <a:pPr marL="800100" lvl="1" indent="-342900">
+              <a:buAutoNum type="arabicParenR"/>
+            </a:pPr>
+            <a:r>
+              <a:rPr lang="en-US" sz="1400" dirty="0"/>
+              <a:t>Bounce motion</a:t>
+            </a:r>
+          </a:p>
+          <a:p>
+            <a:pPr marL="800100" lvl="1" indent="-342900">
+              <a:buAutoNum type="arabicParenR"/>
+            </a:pPr>
+            <a:r>
+              <a:rPr lang="en-US" sz="1400" dirty="0"/>
+              <a:t>Drift motion</a:t>
+            </a:r>
+          </a:p>
+          <a:p>
+            <a:pPr marL="285750" indent="-285750">
+              <a:buFont typeface="Arial" panose="020B0604020202020204" pitchFamily="34" charset="0"/>
+              <a:buChar char="•"/>
+            </a:pPr>
+            <a:r>
+              <a:rPr lang="en-US" sz="1400" dirty="0"/>
+              <a:t>Electrons with </a:t>
+            </a:r>
+            <a:r>
+              <a:rPr lang="en-US" sz="1400" u="sng" dirty="0"/>
+              <a:t>small</a:t>
+            </a:r>
+            <a:r>
+              <a:rPr lang="en-US" sz="1400" dirty="0"/>
+              <a:t> velocity pitch angles relative to the local magnetic field lines will more likely precipitate into the Earth’s atmosphere before bouncing</a:t>
+            </a:r>
+          </a:p>
+          <a:p>
+            <a:pPr marL="285750" indent="-285750">
+              <a:buFont typeface="Arial" panose="020B0604020202020204" pitchFamily="34" charset="0"/>
+              <a:buChar char="•"/>
+            </a:pPr>
+            <a:r>
+              <a:rPr lang="en-US" sz="1400" dirty="0"/>
+              <a:t>Pitch angle anisotropy is defined by how electron population pitch angles are distributed:</a:t>
+            </a:r>
+          </a:p>
+          <a:p>
+            <a:pPr marL="742950" lvl="1" indent="-285750">
+              <a:buFont typeface="Arial" panose="020B0604020202020204" pitchFamily="34" charset="0"/>
+              <a:buChar char="•"/>
+            </a:pPr>
+            <a:r>
+              <a:rPr lang="en-US" sz="1400" dirty="0"/>
+              <a:t>Isotropic: Pitch angles are pointed everywhere equally</a:t>
+            </a:r>
+          </a:p>
+          <a:p>
+            <a:pPr marL="742950" lvl="1" indent="-285750">
+              <a:buFont typeface="Arial" panose="020B0604020202020204" pitchFamily="34" charset="0"/>
+              <a:buChar char="•"/>
+            </a:pPr>
+            <a:r>
+              <a:rPr lang="en-US" sz="1400" dirty="0"/>
+              <a:t>Anisotropic: Pitch angles are pointed unevenly </a:t>
+            </a:r>
+          </a:p>
+        </p:txBody>
+      </p:sp>
+    </p:spTree>
+    <p:extLst>
+      <p:ext uri="{BB962C8B-B14F-4D97-AF65-F5344CB8AC3E}">
+        <p14:creationId xmlns:p14="http://schemas.microsoft.com/office/powerpoint/2010/main" val="3222086888"/>
+      </p:ext>
+    </p:extLst>
+  </p:cSld>
+  <p:clrMapOvr>
+    <a:masterClrMapping/>
+  </p:clrMapOvr>
+</p:sld>
+</file>
+
+<file path=ppt/slides/slide3.xml><?xml version="1.0" encoding="utf-8"?>
+<p:sld xmlns:a="http://schemas.openxmlformats.org/drawingml/2006/main" xmlns:r="http://schemas.openxmlformats.org/officeDocument/2006/relationships" xmlns:p="http://schemas.openxmlformats.org/presentationml/2006/main">
+  <p:cSld>
+    <p:spTree>
+      <p:nvGrpSpPr>
+        <p:cNvPr id="1" name=""/>
+        <p:cNvGrpSpPr/>
+        <p:nvPr/>
+      </p:nvGrpSpPr>
+      <p:grpSpPr>
+        <a:xfrm>
+          <a:off x="0" y="0"/>
+          <a:ext cx="0" cy="0"/>
+          <a:chOff x="0" y="0"/>
+          <a:chExt cx="0" cy="0"/>
+        </a:xfrm>
+      </p:grpSpPr>
+      <p:sp>
+        <p:nvSpPr>
+          <p:cNvPr id="2" name="Title 1">
+            <a:extLst>
+              <a:ext uri="{FF2B5EF4-FFF2-40B4-BE49-F238E27FC236}">
+                <a16:creationId xmlns:a16="http://schemas.microsoft.com/office/drawing/2014/main" id="{B0B672F6-6363-456A-BAA8-77C02F2E0E06}"/>
+              </a:ext>
+            </a:extLst>
+          </p:cNvPr>
+          <p:cNvSpPr>
+            <a:spLocks noGrp="1"/>
+          </p:cNvSpPr>
+          <p:nvPr>
+            <p:ph type="title"/>
+          </p:nvPr>
+        </p:nvSpPr>
+        <p:spPr>
+          <a:xfrm>
+            <a:off x="473892" y="44325"/>
+            <a:ext cx="10515600" cy="1325563"/>
+          </a:xfrm>
+        </p:spPr>
+        <p:txBody>
+          <a:bodyPr/>
+          <a:lstStyle/>
+          <a:p>
+            <a:r>
+              <a:rPr lang="en-US" dirty="0"/>
+              <a:t>Mission Background</a:t>
+            </a:r>
+          </a:p>
+        </p:txBody>
+      </p:sp>
+      <p:pic>
+        <p:nvPicPr>
+          <p:cNvPr id="5" name="Content Placeholder 4" descr="Diagram, engineering drawing&#10;&#10;Description automatically generated">
+            <a:extLst>
+              <a:ext uri="{FF2B5EF4-FFF2-40B4-BE49-F238E27FC236}">
+                <a16:creationId xmlns:a16="http://schemas.microsoft.com/office/drawing/2014/main" id="{7EF509C8-DEC4-4B94-B2B3-587F614D7D2A}"/>
+              </a:ext>
+            </a:extLst>
+          </p:cNvPr>
+          <p:cNvPicPr>
+            <a:picLocks noGrp="1" noChangeAspect="1"/>
+          </p:cNvPicPr>
+          <p:nvPr>
+            <p:ph idx="1"/>
+          </p:nvPr>
+        </p:nvPicPr>
+        <p:blipFill>
+          <a:blip r:embed="rId2">
+            <a:extLst>
+              <a:ext uri="{28A0092B-C50C-407E-A947-70E740481C1C}">
+                <a14:useLocalDpi xmlns:a14="http://schemas.microsoft.com/office/drawing/2010/main" val="0"/>
+              </a:ext>
+            </a:extLst>
+          </a:blip>
+          <a:stretch>
+            <a:fillRect/>
+          </a:stretch>
+        </p:blipFill>
+        <p:spPr>
+          <a:xfrm>
+            <a:off x="6917648" y="304571"/>
+            <a:ext cx="3717710" cy="2772233"/>
+          </a:xfrm>
+        </p:spPr>
+      </p:pic>
+      <p:sp>
+        <p:nvSpPr>
+          <p:cNvPr id="6" name="TextBox 5">
+            <a:extLst>
+              <a:ext uri="{FF2B5EF4-FFF2-40B4-BE49-F238E27FC236}">
+                <a16:creationId xmlns:a16="http://schemas.microsoft.com/office/drawing/2014/main" id="{DA86CB2C-7652-4A5D-B934-4A9BD8C54DA6}"/>
+              </a:ext>
+            </a:extLst>
+          </p:cNvPr>
+          <p:cNvSpPr txBox="1"/>
+          <p:nvPr/>
+        </p:nvSpPr>
+        <p:spPr>
+          <a:xfrm>
+            <a:off x="9157200" y="3076804"/>
+            <a:ext cx="1529875" cy="246221"/>
+          </a:xfrm>
+          <a:prstGeom prst="rect">
+            <a:avLst/>
+          </a:prstGeom>
+          <a:noFill/>
+        </p:spPr>
+        <p:txBody>
+          <a:bodyPr wrap="square">
+            <a:spAutoFit/>
+          </a:bodyPr>
+          <a:lstStyle/>
+          <a:p>
+            <a:r>
+              <a:rPr lang="en-US" sz="1000" dirty="0"/>
+              <a:t>(From </a:t>
+            </a:r>
+            <a:r>
+              <a:rPr lang="en-US" sz="1000" dirty="0" err="1"/>
+              <a:t>eoPortal</a:t>
+            </a:r>
+            <a:r>
+              <a:rPr lang="en-US" sz="1000" dirty="0"/>
+              <a:t> Directory)</a:t>
+            </a:r>
+          </a:p>
+        </p:txBody>
+      </p:sp>
+      <p:pic>
+        <p:nvPicPr>
+          <p:cNvPr id="8" name="Picture 7" descr="Diagram&#10;&#10;Description automatically generated">
+            <a:extLst>
+              <a:ext uri="{FF2B5EF4-FFF2-40B4-BE49-F238E27FC236}">
+                <a16:creationId xmlns:a16="http://schemas.microsoft.com/office/drawing/2014/main" id="{07C04188-D7EF-4CB1-8F66-AAA674C67F0E}"/>
+              </a:ext>
+            </a:extLst>
+          </p:cNvPr>
+          <p:cNvPicPr>
+            <a:picLocks noChangeAspect="1"/>
+          </p:cNvPicPr>
+          <p:nvPr/>
+        </p:nvPicPr>
+        <p:blipFill>
+          <a:blip r:embed="rId3">
+            <a:extLst>
+              <a:ext uri="{28A0092B-C50C-407E-A947-70E740481C1C}">
+                <a14:useLocalDpi xmlns:a14="http://schemas.microsoft.com/office/drawing/2010/main" val="0"/>
+              </a:ext>
+            </a:extLst>
+          </a:blip>
+          <a:stretch>
+            <a:fillRect/>
+          </a:stretch>
+        </p:blipFill>
+        <p:spPr>
+          <a:xfrm>
+            <a:off x="473892" y="2819975"/>
+            <a:ext cx="5021802" cy="3660469"/>
+          </a:xfrm>
+          <a:prstGeom prst="rect">
+            <a:avLst/>
+          </a:prstGeom>
+          <a:ln w="28575">
+            <a:solidFill>
+              <a:schemeClr val="tx1"/>
+            </a:solidFill>
+          </a:ln>
+        </p:spPr>
+      </p:pic>
+      <p:sp>
+        <p:nvSpPr>
+          <p:cNvPr id="9" name="TextBox 8">
+            <a:extLst>
+              <a:ext uri="{FF2B5EF4-FFF2-40B4-BE49-F238E27FC236}">
+                <a16:creationId xmlns:a16="http://schemas.microsoft.com/office/drawing/2014/main" id="{E2F96CA7-F55B-4060-9BCA-3FD5C877A1A1}"/>
+              </a:ext>
+            </a:extLst>
+          </p:cNvPr>
+          <p:cNvSpPr txBox="1"/>
+          <p:nvPr/>
+        </p:nvSpPr>
+        <p:spPr>
+          <a:xfrm>
+            <a:off x="473892" y="6480444"/>
+            <a:ext cx="1529875" cy="246221"/>
+          </a:xfrm>
+          <a:prstGeom prst="rect">
+            <a:avLst/>
+          </a:prstGeom>
+          <a:noFill/>
+        </p:spPr>
+        <p:txBody>
+          <a:bodyPr wrap="square">
+            <a:spAutoFit/>
+          </a:bodyPr>
+          <a:lstStyle/>
+          <a:p>
+            <a:r>
+              <a:rPr lang="en-US" sz="1000" dirty="0"/>
+              <a:t>(From Blake et al, 1996)</a:t>
+            </a:r>
+          </a:p>
+        </p:txBody>
+      </p:sp>
+      <p:sp>
+        <p:nvSpPr>
+          <p:cNvPr id="10" name="TextBox 9">
+            <a:extLst>
+              <a:ext uri="{FF2B5EF4-FFF2-40B4-BE49-F238E27FC236}">
+                <a16:creationId xmlns:a16="http://schemas.microsoft.com/office/drawing/2014/main" id="{6747903C-31A9-43DC-A85C-CEF2EC4F4DA2}"/>
+              </a:ext>
+            </a:extLst>
+          </p:cNvPr>
+          <p:cNvSpPr txBox="1"/>
+          <p:nvPr/>
+        </p:nvSpPr>
+        <p:spPr>
+          <a:xfrm>
+            <a:off x="739430" y="1113767"/>
+            <a:ext cx="5234254" cy="1600438"/>
+          </a:xfrm>
+          <a:prstGeom prst="rect">
+            <a:avLst/>
+          </a:prstGeom>
+          <a:noFill/>
+        </p:spPr>
+        <p:txBody>
+          <a:bodyPr wrap="square">
+            <a:spAutoFit/>
+          </a:bodyPr>
+          <a:lstStyle/>
+          <a:p>
+            <a:pPr marL="285750" indent="-285750">
+              <a:buFont typeface="Arial" panose="020B0604020202020204" pitchFamily="34" charset="0"/>
+              <a:buChar char="•"/>
+            </a:pPr>
+            <a:r>
+              <a:rPr lang="en-US" sz="1400" dirty="0"/>
+              <a:t>The Solar Anomalous and Magnetospheric Particle Explorer (SAMPEX) satellite collected information about particles in the Earth’s radiation belts in near polar orbit from 1992-2004</a:t>
+            </a:r>
+          </a:p>
+          <a:p>
+            <a:pPr marL="285750" indent="-285750">
+              <a:buFont typeface="Arial" panose="020B0604020202020204" pitchFamily="34" charset="0"/>
+              <a:buChar char="•"/>
+            </a:pPr>
+            <a:r>
+              <a:rPr lang="en-US" sz="1400" dirty="0"/>
+              <a:t>The Heavy Ion Large Telescope (HILT) instrument onboard the SAMPEX satellite consisted of 4x4 Silicon detector array that recorded &gt;1 MeV electron counts in high latitude regions of the magnetosphere</a:t>
+            </a:r>
+          </a:p>
+        </p:txBody>
+      </p:sp>
+      <p:sp>
+        <p:nvSpPr>
+          <p:cNvPr id="11" name="TextBox 10">
+            <a:extLst>
+              <a:ext uri="{FF2B5EF4-FFF2-40B4-BE49-F238E27FC236}">
+                <a16:creationId xmlns:a16="http://schemas.microsoft.com/office/drawing/2014/main" id="{46B85775-BB5C-4970-A4A6-F7755AA82B82}"/>
+              </a:ext>
+            </a:extLst>
+          </p:cNvPr>
+          <p:cNvSpPr txBox="1"/>
+          <p:nvPr/>
+        </p:nvSpPr>
+        <p:spPr>
+          <a:xfrm>
+            <a:off x="6096000" y="3534976"/>
+            <a:ext cx="5021802" cy="2677656"/>
+          </a:xfrm>
+          <a:prstGeom prst="rect">
+            <a:avLst/>
+          </a:prstGeom>
+          <a:noFill/>
+        </p:spPr>
+        <p:txBody>
+          <a:bodyPr wrap="square">
+            <a:spAutoFit/>
+          </a:bodyPr>
+          <a:lstStyle/>
+          <a:p>
+            <a:pPr marL="285750" indent="-285750">
+              <a:buFont typeface="Arial" panose="020B0604020202020204" pitchFamily="34" charset="0"/>
+              <a:buChar char="•"/>
+            </a:pPr>
+            <a:r>
+              <a:rPr lang="en-US" sz="1400" dirty="0"/>
+              <a:t>When anisotropic populations of electrons are collected by the HILT instrument, the geometry of the detector rows will cause differences in the total electron counts detected across the array.</a:t>
+            </a:r>
+          </a:p>
+          <a:p>
+            <a:pPr marL="285750" indent="-285750">
+              <a:buFont typeface="Arial" panose="020B0604020202020204" pitchFamily="34" charset="0"/>
+              <a:buChar char="•"/>
+            </a:pPr>
+            <a:r>
+              <a:rPr lang="en-US" sz="1400" dirty="0"/>
+              <a:t>Conversely when isotropic populations of electrons are collected by the HILT instrument, the total electron counts detected will be similar across the array.</a:t>
+            </a:r>
+          </a:p>
+          <a:p>
+            <a:pPr marL="285750" indent="-285750">
+              <a:buFont typeface="Arial" panose="020B0604020202020204" pitchFamily="34" charset="0"/>
+              <a:buChar char="•"/>
+            </a:pPr>
+            <a:r>
+              <a:rPr lang="en-US" sz="1400" dirty="0"/>
+              <a:t>By taking the ratio of electron counts from Row 1 (SSD1) and Row 4 (SSD4) of the detectors,  a measure of </a:t>
+            </a:r>
+            <a:r>
+              <a:rPr lang="en-US" sz="1400" u="sng" dirty="0"/>
+              <a:t>pitch angle isotropy</a:t>
+            </a:r>
+            <a:r>
+              <a:rPr lang="en-US" sz="1400" dirty="0"/>
+              <a:t> can be determined, where:</a:t>
+            </a:r>
+          </a:p>
+          <a:p>
+            <a:pPr marL="742950" lvl="1" indent="-285750">
+              <a:buFont typeface="Arial" panose="020B0604020202020204" pitchFamily="34" charset="0"/>
+              <a:buChar char="•"/>
+            </a:pPr>
+            <a:r>
+              <a:rPr lang="en-US" sz="1400" dirty="0"/>
+              <a:t>Iso = 0  -&gt;  Anisotropic</a:t>
+            </a:r>
+          </a:p>
+          <a:p>
+            <a:pPr marL="742950" lvl="1" indent="-285750">
+              <a:buFont typeface="Arial" panose="020B0604020202020204" pitchFamily="34" charset="0"/>
+              <a:buChar char="•"/>
+            </a:pPr>
+            <a:r>
+              <a:rPr lang="en-US" sz="1400" dirty="0"/>
+              <a:t>Iso = 1  -&gt;  Isotropic</a:t>
+            </a:r>
+          </a:p>
+        </p:txBody>
+      </p:sp>
+    </p:spTree>
+    <p:extLst>
+      <p:ext uri="{BB962C8B-B14F-4D97-AF65-F5344CB8AC3E}">
+        <p14:creationId xmlns:p14="http://schemas.microsoft.com/office/powerpoint/2010/main" val="2291660107"/>
+      </p:ext>
+    </p:extLst>
+  </p:cSld>
+  <p:clrMapOvr>
+    <a:masterClrMapping/>
+  </p:clrMapOvr>
+</p:sld>
+</file>
+
+<file path=ppt/slides/slide4.xml><?xml version="1.0" encoding="utf-8"?>
+<p:sld xmlns:a="http://schemas.openxmlformats.org/drawingml/2006/main" xmlns:r="http://schemas.openxmlformats.org/officeDocument/2006/relationships" xmlns:p="http://schemas.openxmlformats.org/presentationml/2006/main">
+  <p:cSld>
+    <p:spTree>
+      <p:nvGrpSpPr>
+        <p:cNvPr id="1" name=""/>
+        <p:cNvGrpSpPr/>
+        <p:nvPr/>
+      </p:nvGrpSpPr>
+      <p:grpSpPr>
+        <a:xfrm>
+          <a:off x="0" y="0"/>
+          <a:ext cx="0" cy="0"/>
+          <a:chOff x="0" y="0"/>
+          <a:chExt cx="0" cy="0"/>
+        </a:xfrm>
+      </p:grpSpPr>
+      <p:sp>
+        <p:nvSpPr>
+          <p:cNvPr id="2" name="Title 1">
+            <a:extLst>
+              <a:ext uri="{FF2B5EF4-FFF2-40B4-BE49-F238E27FC236}">
+                <a16:creationId xmlns:a16="http://schemas.microsoft.com/office/drawing/2014/main" id="{1C2BB5A2-54FD-4B65-9E96-EFCDD84EEC41}"/>
+              </a:ext>
+            </a:extLst>
+          </p:cNvPr>
+          <p:cNvSpPr>
+            <a:spLocks noGrp="1"/>
+          </p:cNvSpPr>
+          <p:nvPr>
+            <p:ph type="title"/>
+          </p:nvPr>
+        </p:nvSpPr>
+        <p:spPr/>
+        <p:txBody>
+          <a:bodyPr/>
+          <a:lstStyle/>
+          <a:p>
+            <a:r>
+              <a:rPr lang="en-US" dirty="0"/>
+              <a:t>Microburst Research Project</a:t>
+            </a:r>
+          </a:p>
+        </p:txBody>
+      </p:sp>
+      <p:sp>
+        <p:nvSpPr>
+          <p:cNvPr id="3" name="Content Placeholder 2">
+            <a:extLst>
+              <a:ext uri="{FF2B5EF4-FFF2-40B4-BE49-F238E27FC236}">
+                <a16:creationId xmlns:a16="http://schemas.microsoft.com/office/drawing/2014/main" id="{3E502D58-75F5-418B-9FB1-395D51A208BC}"/>
+              </a:ext>
+            </a:extLst>
+          </p:cNvPr>
+          <p:cNvSpPr>
+            <a:spLocks noGrp="1"/>
+          </p:cNvSpPr>
+          <p:nvPr>
+            <p:ph idx="1"/>
+          </p:nvPr>
+        </p:nvSpPr>
+        <p:spPr>
+          <a:xfrm>
+            <a:off x="838200" y="1825625"/>
+            <a:ext cx="8847338" cy="4326600"/>
+          </a:xfrm>
+        </p:spPr>
+        <p:txBody>
+          <a:bodyPr/>
+          <a:lstStyle/>
+          <a:p>
+            <a:pPr marL="514350" indent="-514350">
+              <a:buAutoNum type="arabicParenR"/>
+            </a:pPr>
+            <a:r>
+              <a:rPr lang="en-US" dirty="0"/>
+              <a:t>Statistic year study of microburst occurrence and pitch angle isotropy normalized against the background electron population</a:t>
+            </a:r>
+          </a:p>
+          <a:p>
+            <a:pPr marL="514350" indent="-514350">
+              <a:buAutoNum type="arabicParenR"/>
+            </a:pPr>
+            <a:r>
+              <a:rPr lang="en-US" dirty="0"/>
+              <a:t>4 storm study observing microburst pitch angle isotropy storm-time variance normalized against the background electron population</a:t>
+            </a:r>
+          </a:p>
+        </p:txBody>
+      </p:sp>
+    </p:spTree>
+    <p:extLst>
+      <p:ext uri="{BB962C8B-B14F-4D97-AF65-F5344CB8AC3E}">
+        <p14:creationId xmlns:p14="http://schemas.microsoft.com/office/powerpoint/2010/main" val="3027011006"/>
+      </p:ext>
+    </p:extLst>
+  </p:cSld>
+  <p:clrMapOvr>
+    <a:masterClrMapping/>
+  </p:clrMapOvr>
+</p:sld>
+</file>
+
+<file path=ppt/slides/slide5.xml><?xml version="1.0" encoding="utf-8"?>
 <p:sld xmlns:a="http://schemas.openxmlformats.org/drawingml/2006/main" xmlns:r="http://schemas.openxmlformats.org/officeDocument/2006/relationships" xmlns:p="http://schemas.openxmlformats.org/presentationml/2006/main">
   <p:cSld>
     <p:spTree>
@@ -3650,7 +4717,7 @@
 </p:sld>
 </file>
 
-<file path=ppt/slides/slide3.xml><?xml version="1.0" encoding="utf-8"?>
+<file path=ppt/slides/slide6.xml><?xml version="1.0" encoding="utf-8"?>
 <p:sld xmlns:a="http://schemas.openxmlformats.org/drawingml/2006/main" xmlns:r="http://schemas.openxmlformats.org/officeDocument/2006/relationships" xmlns:p="http://schemas.openxmlformats.org/presentationml/2006/main">
   <p:cSld>
     <p:spTree>
@@ -3850,7 +4917,7 @@
 </p:sld>
 </file>
 
-<file path=ppt/slides/slide4.xml><?xml version="1.0" encoding="utf-8"?>
+<file path=ppt/slides/slide7.xml><?xml version="1.0" encoding="utf-8"?>
 <p:sld xmlns:a="http://schemas.openxmlformats.org/drawingml/2006/main" xmlns:r="http://schemas.openxmlformats.org/officeDocument/2006/relationships" xmlns:p="http://schemas.openxmlformats.org/presentationml/2006/main">
   <p:cSld>
     <p:spTree>
@@ -4062,7 +5129,7 @@
 </p:sld>
 </file>
 
-<file path=ppt/slides/slide5.xml><?xml version="1.0" encoding="utf-8"?>
+<file path=ppt/slides/slide8.xml><?xml version="1.0" encoding="utf-8"?>
 <p:sld xmlns:a="http://schemas.openxmlformats.org/drawingml/2006/main" xmlns:r="http://schemas.openxmlformats.org/officeDocument/2006/relationships" xmlns:p="http://schemas.openxmlformats.org/presentationml/2006/main">
   <p:cSld>
     <p:spTree>
@@ -4079,45 +5146,17 @@
           <a:chExt cx="0" cy="0"/>
         </a:xfrm>
       </p:grpSpPr>
-      <p:sp>
-        <p:nvSpPr>
-          <p:cNvPr id="2" name="Title 1">
-            <a:extLst>
-              <a:ext uri="{FF2B5EF4-FFF2-40B4-BE49-F238E27FC236}">
-                <a16:creationId xmlns:a16="http://schemas.microsoft.com/office/drawing/2014/main" id="{D6F6D986-C79F-4205-B2C5-FDA17180B0EF}"/>
-              </a:ext>
-            </a:extLst>
-          </p:cNvPr>
-          <p:cNvSpPr>
-            <a:spLocks noGrp="1"/>
-          </p:cNvSpPr>
-          <p:nvPr>
-            <p:ph type="title"/>
-          </p:nvPr>
-        </p:nvSpPr>
-        <p:spPr/>
-        <p:txBody>
-          <a:bodyPr/>
-          <a:lstStyle/>
-          <a:p>
-            <a:r>
-              <a:rPr lang="en-US" dirty="0"/>
-              <a:t>Microburst &amp; Background Isotropy vs Time</a:t>
-            </a:r>
-          </a:p>
-        </p:txBody>
-      </p:sp>
       <p:pic>
         <p:nvPicPr>
-          <p:cNvPr id="4" name="Picture 2">
-            <a:extLst>
-              <a:ext uri="{FF2B5EF4-FFF2-40B4-BE49-F238E27FC236}">
-                <a16:creationId xmlns:a16="http://schemas.microsoft.com/office/drawing/2014/main" id="{8FC9B0F0-621E-4299-BE3A-757878448B78}"/>
+          <p:cNvPr id="6" name="Picture 5" descr="Graphical user interface, chart, line chart, scatter chart&#10;&#10;Description automatically generated">
+            <a:extLst>
+              <a:ext uri="{FF2B5EF4-FFF2-40B4-BE49-F238E27FC236}">
+                <a16:creationId xmlns:a16="http://schemas.microsoft.com/office/drawing/2014/main" id="{D007AB65-80AF-48A1-8AAB-1EA05CDBB801}"/>
               </a:ext>
             </a:extLst>
           </p:cNvPr>
           <p:cNvPicPr>
-            <a:picLocks noChangeAspect="1" noChangeArrowheads="1"/>
+            <a:picLocks noChangeAspect="1"/>
           </p:cNvPicPr>
           <p:nvPr/>
         </p:nvPicPr>
@@ -4129,42 +5168,59 @@
               </a:ext>
             </a:extLst>
           </a:blip>
-          <a:srcRect/>
           <a:stretch>
             <a:fillRect/>
           </a:stretch>
         </p:blipFill>
-        <p:spPr bwMode="auto">
+        <p:spPr>
           <a:xfrm>
-            <a:off x="1483300" y="1540565"/>
-            <a:ext cx="8624321" cy="2592911"/>
+            <a:off x="608313" y="1266651"/>
+            <a:ext cx="10378811" cy="2767683"/>
           </a:xfrm>
           <a:prstGeom prst="rect">
             <a:avLst/>
           </a:prstGeom>
-          <a:noFill/>
-          <a:extLst>
-            <a:ext uri="{909E8E84-426E-40DD-AFC4-6F175D3DCCD1}">
-              <a14:hiddenFill xmlns:a14="http://schemas.microsoft.com/office/drawing/2010/main">
-                <a:solidFill>
-                  <a:srgbClr val="FFFFFF"/>
-                </a:solidFill>
-              </a14:hiddenFill>
-            </a:ext>
-          </a:extLst>
         </p:spPr>
       </p:pic>
+      <p:sp>
+        <p:nvSpPr>
+          <p:cNvPr id="2" name="Title 1">
+            <a:extLst>
+              <a:ext uri="{FF2B5EF4-FFF2-40B4-BE49-F238E27FC236}">
+                <a16:creationId xmlns:a16="http://schemas.microsoft.com/office/drawing/2014/main" id="{D6F6D986-C79F-4205-B2C5-FDA17180B0EF}"/>
+              </a:ext>
+            </a:extLst>
+          </p:cNvPr>
+          <p:cNvSpPr>
+            <a:spLocks noGrp="1"/>
+          </p:cNvSpPr>
+          <p:nvPr>
+            <p:ph type="title"/>
+          </p:nvPr>
+        </p:nvSpPr>
+        <p:spPr/>
+        <p:txBody>
+          <a:bodyPr/>
+          <a:lstStyle/>
+          <a:p>
+            <a:r>
+              <a:rPr lang="en-US" dirty="0"/>
+              <a:t>Microburst &amp; Background Isotropy vs Time</a:t>
+            </a:r>
+          </a:p>
+        </p:txBody>
+      </p:sp>
       <p:pic>
         <p:nvPicPr>
-          <p:cNvPr id="5" name="Picture 4">
-            <a:extLst>
-              <a:ext uri="{FF2B5EF4-FFF2-40B4-BE49-F238E27FC236}">
-                <a16:creationId xmlns:a16="http://schemas.microsoft.com/office/drawing/2014/main" id="{C2BC4962-001D-4572-A80B-E067A38C4C36}"/>
+          <p:cNvPr id="8" name="Picture 7" descr="Chart, line chart&#10;&#10;Description automatically generated">
+            <a:extLst>
+              <a:ext uri="{FF2B5EF4-FFF2-40B4-BE49-F238E27FC236}">
+                <a16:creationId xmlns:a16="http://schemas.microsoft.com/office/drawing/2014/main" id="{53090390-4063-4657-96B4-C931CE9F5760}"/>
               </a:ext>
             </a:extLst>
           </p:cNvPr>
           <p:cNvPicPr>
-            <a:picLocks noChangeAspect="1" noChangeArrowheads="1"/>
+            <a:picLocks noChangeAspect="1"/>
           </p:cNvPicPr>
           <p:nvPr/>
         </p:nvPicPr>
@@ -4176,29 +5232,18 @@
               </a:ext>
             </a:extLst>
           </a:blip>
-          <a:srcRect/>
           <a:stretch>
             <a:fillRect/>
           </a:stretch>
         </p:blipFill>
-        <p:spPr bwMode="auto">
+        <p:spPr>
           <a:xfrm>
-            <a:off x="1483300" y="4133476"/>
-            <a:ext cx="8624321" cy="2594033"/>
+            <a:off x="608313" y="3969019"/>
+            <a:ext cx="10378811" cy="2767683"/>
           </a:xfrm>
           <a:prstGeom prst="rect">
             <a:avLst/>
           </a:prstGeom>
-          <a:noFill/>
-          <a:extLst>
-            <a:ext uri="{909E8E84-426E-40DD-AFC4-6F175D3DCCD1}">
-              <a14:hiddenFill xmlns:a14="http://schemas.microsoft.com/office/drawing/2010/main">
-                <a:solidFill>
-                  <a:srgbClr val="FFFFFF"/>
-                </a:solidFill>
-              </a14:hiddenFill>
-            </a:ext>
-          </a:extLst>
         </p:spPr>
       </p:pic>
     </p:spTree>
@@ -4214,7 +5259,7 @@
 </p:sld>
 </file>
 
-<file path=ppt/slides/slide6.xml><?xml version="1.0" encoding="utf-8"?>
+<file path=ppt/slides/slide9.xml><?xml version="1.0" encoding="utf-8"?>
 <p:sld xmlns:a="http://schemas.openxmlformats.org/drawingml/2006/main" xmlns:r="http://schemas.openxmlformats.org/officeDocument/2006/relationships" xmlns:p="http://schemas.openxmlformats.org/presentationml/2006/main">
   <p:cSld>
     <p:spTree>
@@ -4357,163 +5402,6 @@
     <p:extLst>
       <p:ext uri="{BB962C8B-B14F-4D97-AF65-F5344CB8AC3E}">
         <p14:creationId xmlns:p14="http://schemas.microsoft.com/office/powerpoint/2010/main" val="2807284388"/>
-      </p:ext>
-    </p:extLst>
-  </p:cSld>
-  <p:clrMapOvr>
-    <a:masterClrMapping/>
-  </p:clrMapOvr>
-</p:sld>
-</file>
-
-<file path=ppt/slides/slide7.xml><?xml version="1.0" encoding="utf-8"?>
-<p:sld xmlns:a="http://schemas.openxmlformats.org/drawingml/2006/main" xmlns:r="http://schemas.openxmlformats.org/officeDocument/2006/relationships" xmlns:p="http://schemas.openxmlformats.org/presentationml/2006/main">
-  <p:cSld>
-    <p:spTree>
-      <p:nvGrpSpPr>
-        <p:cNvPr id="1" name=""/>
-        <p:cNvGrpSpPr/>
-        <p:nvPr/>
-      </p:nvGrpSpPr>
-      <p:grpSpPr>
-        <a:xfrm>
-          <a:off x="0" y="0"/>
-          <a:ext cx="0" cy="0"/>
-          <a:chOff x="0" y="0"/>
-          <a:chExt cx="0" cy="0"/>
-        </a:xfrm>
-      </p:grpSpPr>
-      <p:sp>
-        <p:nvSpPr>
-          <p:cNvPr id="4" name="Title 1">
-            <a:extLst>
-              <a:ext uri="{FF2B5EF4-FFF2-40B4-BE49-F238E27FC236}">
-                <a16:creationId xmlns:a16="http://schemas.microsoft.com/office/drawing/2014/main" id="{3835412D-5D74-40CD-AE73-A55A23B5A6CA}"/>
-              </a:ext>
-            </a:extLst>
-          </p:cNvPr>
-          <p:cNvSpPr>
-            <a:spLocks noGrp="1"/>
-          </p:cNvSpPr>
-          <p:nvPr>
-            <p:ph type="title"/>
-          </p:nvPr>
-        </p:nvSpPr>
-        <p:spPr>
-          <a:xfrm>
-            <a:off x="838200" y="365125"/>
-            <a:ext cx="10515600" cy="1325563"/>
-          </a:xfrm>
-        </p:spPr>
-        <p:txBody>
-          <a:bodyPr/>
-          <a:lstStyle/>
-          <a:p>
-            <a:r>
-              <a:rPr lang="en-US" dirty="0"/>
-              <a:t>Microburst Occurrences vs Magnetic Indices (cont’d)</a:t>
-            </a:r>
-          </a:p>
-        </p:txBody>
-      </p:sp>
-      <p:pic>
-        <p:nvPicPr>
-          <p:cNvPr id="5122" name="Picture 2">
-            <a:extLst>
-              <a:ext uri="{FF2B5EF4-FFF2-40B4-BE49-F238E27FC236}">
-                <a16:creationId xmlns:a16="http://schemas.microsoft.com/office/drawing/2014/main" id="{A04A2056-C968-46E5-9E1C-3FC54CEA06EE}"/>
-              </a:ext>
-            </a:extLst>
-          </p:cNvPr>
-          <p:cNvPicPr>
-            <a:picLocks noChangeAspect="1" noChangeArrowheads="1"/>
-          </p:cNvPicPr>
-          <p:nvPr/>
-        </p:nvPicPr>
-        <p:blipFill>
-          <a:blip r:embed="rId2">
-            <a:extLst>
-              <a:ext uri="{28A0092B-C50C-407E-A947-70E740481C1C}">
-                <a14:useLocalDpi xmlns:a14="http://schemas.microsoft.com/office/drawing/2010/main" val="0"/>
-              </a:ext>
-            </a:extLst>
-          </a:blip>
-          <a:srcRect/>
-          <a:stretch>
-            <a:fillRect/>
-          </a:stretch>
-        </p:blipFill>
-        <p:spPr bwMode="auto">
-          <a:xfrm>
-            <a:off x="2373681" y="1498606"/>
-            <a:ext cx="7118960" cy="2596381"/>
-          </a:xfrm>
-          <a:prstGeom prst="rect">
-            <a:avLst/>
-          </a:prstGeom>
-          <a:noFill/>
-          <a:extLst>
-            <a:ext uri="{909E8E84-426E-40DD-AFC4-6F175D3DCCD1}">
-              <a14:hiddenFill xmlns:a14="http://schemas.microsoft.com/office/drawing/2010/main">
-                <a:solidFill>
-                  <a:srgbClr val="FFFFFF"/>
-                </a:solidFill>
-              </a14:hiddenFill>
-            </a:ext>
-          </a:extLst>
-        </p:spPr>
-      </p:pic>
-      <p:pic>
-        <p:nvPicPr>
-          <p:cNvPr id="5124" name="Picture 4">
-            <a:extLst>
-              <a:ext uri="{FF2B5EF4-FFF2-40B4-BE49-F238E27FC236}">
-                <a16:creationId xmlns:a16="http://schemas.microsoft.com/office/drawing/2014/main" id="{F83D4E49-10DA-45C9-B97F-13E602EBFB15}"/>
-              </a:ext>
-            </a:extLst>
-          </p:cNvPr>
-          <p:cNvPicPr>
-            <a:picLocks noChangeAspect="1" noChangeArrowheads="1"/>
-          </p:cNvPicPr>
-          <p:nvPr/>
-        </p:nvPicPr>
-        <p:blipFill>
-          <a:blip r:embed="rId3">
-            <a:extLst>
-              <a:ext uri="{28A0092B-C50C-407E-A947-70E740481C1C}">
-                <a14:useLocalDpi xmlns:a14="http://schemas.microsoft.com/office/drawing/2010/main" val="0"/>
-              </a:ext>
-            </a:extLst>
-          </a:blip>
-          <a:srcRect/>
-          <a:stretch>
-            <a:fillRect/>
-          </a:stretch>
-        </p:blipFill>
-        <p:spPr bwMode="auto">
-          <a:xfrm>
-            <a:off x="2373680" y="4094987"/>
-            <a:ext cx="7118961" cy="2596381"/>
-          </a:xfrm>
-          <a:prstGeom prst="rect">
-            <a:avLst/>
-          </a:prstGeom>
-          <a:noFill/>
-          <a:extLst>
-            <a:ext uri="{909E8E84-426E-40DD-AFC4-6F175D3DCCD1}">
-              <a14:hiddenFill xmlns:a14="http://schemas.microsoft.com/office/drawing/2010/main">
-                <a:solidFill>
-                  <a:srgbClr val="FFFFFF"/>
-                </a:solidFill>
-              </a14:hiddenFill>
-            </a:ext>
-          </a:extLst>
-        </p:spPr>
-      </p:pic>
-    </p:spTree>
-    <p:extLst>
-      <p:ext uri="{BB962C8B-B14F-4D97-AF65-F5344CB8AC3E}">
-        <p14:creationId xmlns:p14="http://schemas.microsoft.com/office/powerpoint/2010/main" val="1084330929"/>
       </p:ext>
     </p:extLst>
   </p:cSld>

</xml_diff>

<commit_message>
Added files to concept summaries
</commit_message>
<xml_diff>
--- a/sampexlib/Concept Summaries/LASP Research Summary.pptx
+++ b/sampexlib/Concept Summaries/LASP Research Summary.pptx
@@ -268,7 +268,7 @@
           <a:p>
             <a:fld id="{4E9E4D5A-70D9-49DB-B396-8E67F4DFB91A}" type="datetimeFigureOut">
               <a:rPr lang="en-US" smtClean="0"/>
-              <a:t>9/8/2021</a:t>
+              <a:t>9/16/2021</a:t>
             </a:fld>
             <a:endParaRPr lang="en-US"/>
           </a:p>
@@ -466,7 +466,7 @@
           <a:p>
             <a:fld id="{4E9E4D5A-70D9-49DB-B396-8E67F4DFB91A}" type="datetimeFigureOut">
               <a:rPr lang="en-US" smtClean="0"/>
-              <a:t>9/8/2021</a:t>
+              <a:t>9/16/2021</a:t>
             </a:fld>
             <a:endParaRPr lang="en-US"/>
           </a:p>
@@ -674,7 +674,7 @@
           <a:p>
             <a:fld id="{4E9E4D5A-70D9-49DB-B396-8E67F4DFB91A}" type="datetimeFigureOut">
               <a:rPr lang="en-US" smtClean="0"/>
-              <a:t>9/8/2021</a:t>
+              <a:t>9/16/2021</a:t>
             </a:fld>
             <a:endParaRPr lang="en-US"/>
           </a:p>
@@ -872,7 +872,7 @@
           <a:p>
             <a:fld id="{4E9E4D5A-70D9-49DB-B396-8E67F4DFB91A}" type="datetimeFigureOut">
               <a:rPr lang="en-US" smtClean="0"/>
-              <a:t>9/8/2021</a:t>
+              <a:t>9/16/2021</a:t>
             </a:fld>
             <a:endParaRPr lang="en-US"/>
           </a:p>
@@ -1147,7 +1147,7 @@
           <a:p>
             <a:fld id="{4E9E4D5A-70D9-49DB-B396-8E67F4DFB91A}" type="datetimeFigureOut">
               <a:rPr lang="en-US" smtClean="0"/>
-              <a:t>9/8/2021</a:t>
+              <a:t>9/16/2021</a:t>
             </a:fld>
             <a:endParaRPr lang="en-US"/>
           </a:p>
@@ -1412,7 +1412,7 @@
           <a:p>
             <a:fld id="{4E9E4D5A-70D9-49DB-B396-8E67F4DFB91A}" type="datetimeFigureOut">
               <a:rPr lang="en-US" smtClean="0"/>
-              <a:t>9/8/2021</a:t>
+              <a:t>9/16/2021</a:t>
             </a:fld>
             <a:endParaRPr lang="en-US"/>
           </a:p>
@@ -1824,7 +1824,7 @@
           <a:p>
             <a:fld id="{4E9E4D5A-70D9-49DB-B396-8E67F4DFB91A}" type="datetimeFigureOut">
               <a:rPr lang="en-US" smtClean="0"/>
-              <a:t>9/8/2021</a:t>
+              <a:t>9/16/2021</a:t>
             </a:fld>
             <a:endParaRPr lang="en-US"/>
           </a:p>
@@ -1965,7 +1965,7 @@
           <a:p>
             <a:fld id="{4E9E4D5A-70D9-49DB-B396-8E67F4DFB91A}" type="datetimeFigureOut">
               <a:rPr lang="en-US" smtClean="0"/>
-              <a:t>9/8/2021</a:t>
+              <a:t>9/16/2021</a:t>
             </a:fld>
             <a:endParaRPr lang="en-US"/>
           </a:p>
@@ -2078,7 +2078,7 @@
           <a:p>
             <a:fld id="{4E9E4D5A-70D9-49DB-B396-8E67F4DFB91A}" type="datetimeFigureOut">
               <a:rPr lang="en-US" smtClean="0"/>
-              <a:t>9/8/2021</a:t>
+              <a:t>9/16/2021</a:t>
             </a:fld>
             <a:endParaRPr lang="en-US"/>
           </a:p>
@@ -2389,7 +2389,7 @@
           <a:p>
             <a:fld id="{4E9E4D5A-70D9-49DB-B396-8E67F4DFB91A}" type="datetimeFigureOut">
               <a:rPr lang="en-US" smtClean="0"/>
-              <a:t>9/8/2021</a:t>
+              <a:t>9/16/2021</a:t>
             </a:fld>
             <a:endParaRPr lang="en-US"/>
           </a:p>
@@ -2677,7 +2677,7 @@
           <a:p>
             <a:fld id="{4E9E4D5A-70D9-49DB-B396-8E67F4DFB91A}" type="datetimeFigureOut">
               <a:rPr lang="en-US" smtClean="0"/>
-              <a:t>9/8/2021</a:t>
+              <a:t>9/16/2021</a:t>
             </a:fld>
             <a:endParaRPr lang="en-US"/>
           </a:p>
@@ -2918,7 +2918,7 @@
           <a:p>
             <a:fld id="{4E9E4D5A-70D9-49DB-B396-8E67F4DFB91A}" type="datetimeFigureOut">
               <a:rPr lang="en-US" smtClean="0"/>
-              <a:t>9/8/2021</a:t>
+              <a:t>9/16/2021</a:t>
             </a:fld>
             <a:endParaRPr lang="en-US"/>
           </a:p>

</xml_diff>

<commit_message>
Created a new powerpoitn
</commit_message>
<xml_diff>
--- a/sampexlib/Concept Summaries/LASP Research Summary.pptx
+++ b/sampexlib/Concept Summaries/LASP Research Summary.pptx
@@ -268,7 +268,7 @@
           <a:p>
             <a:fld id="{4E9E4D5A-70D9-49DB-B396-8E67F4DFB91A}" type="datetimeFigureOut">
               <a:rPr lang="en-US" smtClean="0"/>
-              <a:t>9/8/2021</a:t>
+              <a:t>9/22/2021</a:t>
             </a:fld>
             <a:endParaRPr lang="en-US"/>
           </a:p>
@@ -466,7 +466,7 @@
           <a:p>
             <a:fld id="{4E9E4D5A-70D9-49DB-B396-8E67F4DFB91A}" type="datetimeFigureOut">
               <a:rPr lang="en-US" smtClean="0"/>
-              <a:t>9/8/2021</a:t>
+              <a:t>9/22/2021</a:t>
             </a:fld>
             <a:endParaRPr lang="en-US"/>
           </a:p>
@@ -674,7 +674,7 @@
           <a:p>
             <a:fld id="{4E9E4D5A-70D9-49DB-B396-8E67F4DFB91A}" type="datetimeFigureOut">
               <a:rPr lang="en-US" smtClean="0"/>
-              <a:t>9/8/2021</a:t>
+              <a:t>9/22/2021</a:t>
             </a:fld>
             <a:endParaRPr lang="en-US"/>
           </a:p>
@@ -872,7 +872,7 @@
           <a:p>
             <a:fld id="{4E9E4D5A-70D9-49DB-B396-8E67F4DFB91A}" type="datetimeFigureOut">
               <a:rPr lang="en-US" smtClean="0"/>
-              <a:t>9/8/2021</a:t>
+              <a:t>9/22/2021</a:t>
             </a:fld>
             <a:endParaRPr lang="en-US"/>
           </a:p>
@@ -1147,7 +1147,7 @@
           <a:p>
             <a:fld id="{4E9E4D5A-70D9-49DB-B396-8E67F4DFB91A}" type="datetimeFigureOut">
               <a:rPr lang="en-US" smtClean="0"/>
-              <a:t>9/8/2021</a:t>
+              <a:t>9/22/2021</a:t>
             </a:fld>
             <a:endParaRPr lang="en-US"/>
           </a:p>
@@ -1412,7 +1412,7 @@
           <a:p>
             <a:fld id="{4E9E4D5A-70D9-49DB-B396-8E67F4DFB91A}" type="datetimeFigureOut">
               <a:rPr lang="en-US" smtClean="0"/>
-              <a:t>9/8/2021</a:t>
+              <a:t>9/22/2021</a:t>
             </a:fld>
             <a:endParaRPr lang="en-US"/>
           </a:p>
@@ -1824,7 +1824,7 @@
           <a:p>
             <a:fld id="{4E9E4D5A-70D9-49DB-B396-8E67F4DFB91A}" type="datetimeFigureOut">
               <a:rPr lang="en-US" smtClean="0"/>
-              <a:t>9/8/2021</a:t>
+              <a:t>9/22/2021</a:t>
             </a:fld>
             <a:endParaRPr lang="en-US"/>
           </a:p>
@@ -1965,7 +1965,7 @@
           <a:p>
             <a:fld id="{4E9E4D5A-70D9-49DB-B396-8E67F4DFB91A}" type="datetimeFigureOut">
               <a:rPr lang="en-US" smtClean="0"/>
-              <a:t>9/8/2021</a:t>
+              <a:t>9/22/2021</a:t>
             </a:fld>
             <a:endParaRPr lang="en-US"/>
           </a:p>
@@ -2078,7 +2078,7 @@
           <a:p>
             <a:fld id="{4E9E4D5A-70D9-49DB-B396-8E67F4DFB91A}" type="datetimeFigureOut">
               <a:rPr lang="en-US" smtClean="0"/>
-              <a:t>9/8/2021</a:t>
+              <a:t>9/22/2021</a:t>
             </a:fld>
             <a:endParaRPr lang="en-US"/>
           </a:p>
@@ -2389,7 +2389,7 @@
           <a:p>
             <a:fld id="{4E9E4D5A-70D9-49DB-B396-8E67F4DFB91A}" type="datetimeFigureOut">
               <a:rPr lang="en-US" smtClean="0"/>
-              <a:t>9/8/2021</a:t>
+              <a:t>9/22/2021</a:t>
             </a:fld>
             <a:endParaRPr lang="en-US"/>
           </a:p>
@@ -2677,7 +2677,7 @@
           <a:p>
             <a:fld id="{4E9E4D5A-70D9-49DB-B396-8E67F4DFB91A}" type="datetimeFigureOut">
               <a:rPr lang="en-US" smtClean="0"/>
-              <a:t>9/8/2021</a:t>
+              <a:t>9/22/2021</a:t>
             </a:fld>
             <a:endParaRPr lang="en-US"/>
           </a:p>
@@ -2918,7 +2918,7 @@
           <a:p>
             <a:fld id="{4E9E4D5A-70D9-49DB-B396-8E67F4DFB91A}" type="datetimeFigureOut">
               <a:rPr lang="en-US" smtClean="0"/>
-              <a:t>9/8/2021</a:t>
+              <a:t>9/22/2021</a:t>
             </a:fld>
             <a:endParaRPr lang="en-US"/>
           </a:p>

</xml_diff>

<commit_message>
Made changes to presentations and small code edits
</commit_message>
<xml_diff>
--- a/sampexlib/Concept Summaries/LASP Research Summary.pptx
+++ b/sampexlib/Concept Summaries/LASP Research Summary.pptx
@@ -269,7 +269,7 @@
           <a:p>
             <a:fld id="{4E9E4D5A-70D9-49DB-B396-8E67F4DFB91A}" type="datetimeFigureOut">
               <a:rPr lang="en-US" smtClean="0"/>
-              <a:t>10/6/2021</a:t>
+              <a:t>10/19/2021</a:t>
             </a:fld>
             <a:endParaRPr lang="en-US"/>
           </a:p>
@@ -467,7 +467,7 @@
           <a:p>
             <a:fld id="{4E9E4D5A-70D9-49DB-B396-8E67F4DFB91A}" type="datetimeFigureOut">
               <a:rPr lang="en-US" smtClean="0"/>
-              <a:t>10/6/2021</a:t>
+              <a:t>10/19/2021</a:t>
             </a:fld>
             <a:endParaRPr lang="en-US"/>
           </a:p>
@@ -675,7 +675,7 @@
           <a:p>
             <a:fld id="{4E9E4D5A-70D9-49DB-B396-8E67F4DFB91A}" type="datetimeFigureOut">
               <a:rPr lang="en-US" smtClean="0"/>
-              <a:t>10/6/2021</a:t>
+              <a:t>10/19/2021</a:t>
             </a:fld>
             <a:endParaRPr lang="en-US"/>
           </a:p>
@@ -873,7 +873,7 @@
           <a:p>
             <a:fld id="{4E9E4D5A-70D9-49DB-B396-8E67F4DFB91A}" type="datetimeFigureOut">
               <a:rPr lang="en-US" smtClean="0"/>
-              <a:t>10/6/2021</a:t>
+              <a:t>10/19/2021</a:t>
             </a:fld>
             <a:endParaRPr lang="en-US"/>
           </a:p>
@@ -1148,7 +1148,7 @@
           <a:p>
             <a:fld id="{4E9E4D5A-70D9-49DB-B396-8E67F4DFB91A}" type="datetimeFigureOut">
               <a:rPr lang="en-US" smtClean="0"/>
-              <a:t>10/6/2021</a:t>
+              <a:t>10/19/2021</a:t>
             </a:fld>
             <a:endParaRPr lang="en-US"/>
           </a:p>
@@ -1413,7 +1413,7 @@
           <a:p>
             <a:fld id="{4E9E4D5A-70D9-49DB-B396-8E67F4DFB91A}" type="datetimeFigureOut">
               <a:rPr lang="en-US" smtClean="0"/>
-              <a:t>10/6/2021</a:t>
+              <a:t>10/19/2021</a:t>
             </a:fld>
             <a:endParaRPr lang="en-US"/>
           </a:p>
@@ -1825,7 +1825,7 @@
           <a:p>
             <a:fld id="{4E9E4D5A-70D9-49DB-B396-8E67F4DFB91A}" type="datetimeFigureOut">
               <a:rPr lang="en-US" smtClean="0"/>
-              <a:t>10/6/2021</a:t>
+              <a:t>10/19/2021</a:t>
             </a:fld>
             <a:endParaRPr lang="en-US"/>
           </a:p>
@@ -1966,7 +1966,7 @@
           <a:p>
             <a:fld id="{4E9E4D5A-70D9-49DB-B396-8E67F4DFB91A}" type="datetimeFigureOut">
               <a:rPr lang="en-US" smtClean="0"/>
-              <a:t>10/6/2021</a:t>
+              <a:t>10/19/2021</a:t>
             </a:fld>
             <a:endParaRPr lang="en-US"/>
           </a:p>
@@ -2079,7 +2079,7 @@
           <a:p>
             <a:fld id="{4E9E4D5A-70D9-49DB-B396-8E67F4DFB91A}" type="datetimeFigureOut">
               <a:rPr lang="en-US" smtClean="0"/>
-              <a:t>10/6/2021</a:t>
+              <a:t>10/19/2021</a:t>
             </a:fld>
             <a:endParaRPr lang="en-US"/>
           </a:p>
@@ -2390,7 +2390,7 @@
           <a:p>
             <a:fld id="{4E9E4D5A-70D9-49DB-B396-8E67F4DFB91A}" type="datetimeFigureOut">
               <a:rPr lang="en-US" smtClean="0"/>
-              <a:t>10/6/2021</a:t>
+              <a:t>10/19/2021</a:t>
             </a:fld>
             <a:endParaRPr lang="en-US"/>
           </a:p>
@@ -2678,7 +2678,7 @@
           <a:p>
             <a:fld id="{4E9E4D5A-70D9-49DB-B396-8E67F4DFB91A}" type="datetimeFigureOut">
               <a:rPr lang="en-US" smtClean="0"/>
-              <a:t>10/6/2021</a:t>
+              <a:t>10/19/2021</a:t>
             </a:fld>
             <a:endParaRPr lang="en-US"/>
           </a:p>
@@ -2919,7 +2919,7 @@
           <a:p>
             <a:fld id="{4E9E4D5A-70D9-49DB-B396-8E67F4DFB91A}" type="datetimeFigureOut">
               <a:rPr lang="en-US" smtClean="0"/>
-              <a:t>10/6/2021</a:t>
+              <a:t>10/19/2021</a:t>
             </a:fld>
             <a:endParaRPr lang="en-US"/>
           </a:p>
@@ -5002,83 +5002,17 @@
           <a:chExt cx="0" cy="0"/>
         </a:xfrm>
       </p:grpSpPr>
-      <p:sp>
-        <p:nvSpPr>
-          <p:cNvPr id="2" name="Title 1">
-            <a:extLst>
-              <a:ext uri="{FF2B5EF4-FFF2-40B4-BE49-F238E27FC236}">
-                <a16:creationId xmlns:a16="http://schemas.microsoft.com/office/drawing/2014/main" id="{518E32CD-86E0-4E24-AFB6-1E911121759E}"/>
-              </a:ext>
-            </a:extLst>
-          </p:cNvPr>
-          <p:cNvSpPr>
-            <a:spLocks noGrp="1"/>
-          </p:cNvSpPr>
-          <p:nvPr>
-            <p:ph type="title"/>
-          </p:nvPr>
-        </p:nvSpPr>
-        <p:spPr/>
-        <p:txBody>
-          <a:bodyPr/>
-          <a:lstStyle/>
-          <a:p>
-            <a:r>
-              <a:rPr lang="en-US" dirty="0"/>
-              <a:t>Microburst &amp; Background Iso-MLT-L Plots</a:t>
-            </a:r>
-          </a:p>
-        </p:txBody>
-      </p:sp>
-      <p:sp>
-        <p:nvSpPr>
-          <p:cNvPr id="6" name="Content Placeholder 2">
-            <a:extLst>
-              <a:ext uri="{FF2B5EF4-FFF2-40B4-BE49-F238E27FC236}">
-                <a16:creationId xmlns:a16="http://schemas.microsoft.com/office/drawing/2014/main" id="{37D8C9CB-FBA6-49FB-91E5-9CDCFFB2035F}"/>
-              </a:ext>
-            </a:extLst>
-          </p:cNvPr>
-          <p:cNvSpPr>
-            <a:spLocks noGrp="1"/>
-          </p:cNvSpPr>
-          <p:nvPr>
-            <p:ph idx="1"/>
-          </p:nvPr>
-        </p:nvSpPr>
-        <p:spPr>
-          <a:xfrm>
-            <a:off x="650123" y="1923279"/>
-            <a:ext cx="11288697" cy="775532"/>
-          </a:xfrm>
-        </p:spPr>
-        <p:txBody>
-          <a:bodyPr>
-            <a:normAutofit/>
-          </a:bodyPr>
-          <a:lstStyle/>
-          <a:p>
-            <a:pPr marL="0" indent="0">
-              <a:buNone/>
-            </a:pPr>
-            <a:r>
-              <a:rPr lang="en-US" dirty="0"/>
-              <a:t>1) Microburst				2) Background</a:t>
-            </a:r>
-          </a:p>
-        </p:txBody>
-      </p:sp>
       <p:pic>
         <p:nvPicPr>
-          <p:cNvPr id="1026" name="Picture 2">
-            <a:extLst>
-              <a:ext uri="{FF2B5EF4-FFF2-40B4-BE49-F238E27FC236}">
-                <a16:creationId xmlns:a16="http://schemas.microsoft.com/office/drawing/2014/main" id="{1A90665A-A87D-4AED-82F7-4F61F5DA8F7B}"/>
+          <p:cNvPr id="4" name="Picture 3">
+            <a:extLst>
+              <a:ext uri="{FF2B5EF4-FFF2-40B4-BE49-F238E27FC236}">
+                <a16:creationId xmlns:a16="http://schemas.microsoft.com/office/drawing/2014/main" id="{D830FE8A-CD12-48B3-BF85-3B319A858416}"/>
               </a:ext>
             </a:extLst>
           </p:cNvPr>
           <p:cNvPicPr>
-            <a:picLocks noChangeAspect="1" noChangeArrowheads="1"/>
+            <a:picLocks noChangeAspect="1"/>
           </p:cNvPicPr>
           <p:nvPr/>
         </p:nvPicPr>
@@ -5090,47 +5024,102 @@
               </a:ext>
             </a:extLst>
           </a:blip>
-          <a:srcRect/>
           <a:stretch>
             <a:fillRect/>
           </a:stretch>
         </p:blipFill>
-        <p:spPr bwMode="auto">
-          <a:xfrm>
-            <a:off x="650123" y="2493603"/>
-            <a:ext cx="4844144" cy="4024045"/>
+        <p:spPr>
+          <a:xfrm>
+            <a:off x="644182" y="2496842"/>
+            <a:ext cx="4844145" cy="4024046"/>
           </a:xfrm>
           <a:prstGeom prst="rect">
             <a:avLst/>
           </a:prstGeom>
-          <a:noFill/>
           <a:ln w="19050">
             <a:solidFill>
               <a:schemeClr val="tx1"/>
             </a:solidFill>
           </a:ln>
-          <a:extLst>
-            <a:ext uri="{909E8E84-426E-40DD-AFC4-6F175D3DCCD1}">
-              <a14:hiddenFill xmlns:a14="http://schemas.microsoft.com/office/drawing/2010/main">
-                <a:solidFill>
-                  <a:srgbClr val="FFFFFF"/>
-                </a:solidFill>
-              </a14:hiddenFill>
-            </a:ext>
-          </a:extLst>
         </p:spPr>
       </p:pic>
+      <p:sp>
+        <p:nvSpPr>
+          <p:cNvPr id="2" name="Title 1">
+            <a:extLst>
+              <a:ext uri="{FF2B5EF4-FFF2-40B4-BE49-F238E27FC236}">
+                <a16:creationId xmlns:a16="http://schemas.microsoft.com/office/drawing/2014/main" id="{518E32CD-86E0-4E24-AFB6-1E911121759E}"/>
+              </a:ext>
+            </a:extLst>
+          </p:cNvPr>
+          <p:cNvSpPr>
+            <a:spLocks noGrp="1"/>
+          </p:cNvSpPr>
+          <p:nvPr>
+            <p:ph type="title"/>
+          </p:nvPr>
+        </p:nvSpPr>
+        <p:spPr/>
+        <p:txBody>
+          <a:bodyPr/>
+          <a:lstStyle/>
+          <a:p>
+            <a:r>
+              <a:rPr lang="en-US" dirty="0"/>
+              <a:t>Microburst &amp; Background Iso-MLT-L Plots</a:t>
+            </a:r>
+          </a:p>
+        </p:txBody>
+      </p:sp>
+      <p:sp>
+        <p:nvSpPr>
+          <p:cNvPr id="6" name="Content Placeholder 2">
+            <a:extLst>
+              <a:ext uri="{FF2B5EF4-FFF2-40B4-BE49-F238E27FC236}">
+                <a16:creationId xmlns:a16="http://schemas.microsoft.com/office/drawing/2014/main" id="{37D8C9CB-FBA6-49FB-91E5-9CDCFFB2035F}"/>
+              </a:ext>
+            </a:extLst>
+          </p:cNvPr>
+          <p:cNvSpPr>
+            <a:spLocks noGrp="1"/>
+          </p:cNvSpPr>
+          <p:nvPr>
+            <p:ph idx="1"/>
+          </p:nvPr>
+        </p:nvSpPr>
+        <p:spPr>
+          <a:xfrm>
+            <a:off x="650123" y="1923279"/>
+            <a:ext cx="11288697" cy="775532"/>
+          </a:xfrm>
+        </p:spPr>
+        <p:txBody>
+          <a:bodyPr>
+            <a:normAutofit/>
+          </a:bodyPr>
+          <a:lstStyle/>
+          <a:p>
+            <a:pPr marL="0" indent="0">
+              <a:buNone/>
+            </a:pPr>
+            <a:r>
+              <a:rPr lang="en-US" dirty="0"/>
+              <a:t>1) Microburst				2) Background</a:t>
+            </a:r>
+          </a:p>
+        </p:txBody>
+      </p:sp>
       <p:pic>
         <p:nvPicPr>
-          <p:cNvPr id="1028" name="Picture 4">
-            <a:extLst>
-              <a:ext uri="{FF2B5EF4-FFF2-40B4-BE49-F238E27FC236}">
-                <a16:creationId xmlns:a16="http://schemas.microsoft.com/office/drawing/2014/main" id="{8D0C601D-7625-4336-942F-F90CD2A0F91B}"/>
+          <p:cNvPr id="7" name="Picture 6">
+            <a:extLst>
+              <a:ext uri="{FF2B5EF4-FFF2-40B4-BE49-F238E27FC236}">
+                <a16:creationId xmlns:a16="http://schemas.microsoft.com/office/drawing/2014/main" id="{02E5BD1B-2B69-41DE-B26B-B185EDEC6252}"/>
               </a:ext>
             </a:extLst>
           </p:cNvPr>
           <p:cNvPicPr>
-            <a:picLocks noChangeAspect="1" noChangeArrowheads="1"/>
+            <a:picLocks noChangeAspect="1"/>
           </p:cNvPicPr>
           <p:nvPr/>
         </p:nvPicPr>
@@ -5142,34 +5131,23 @@
               </a:ext>
             </a:extLst>
           </a:blip>
-          <a:srcRect/>
           <a:stretch>
             <a:fillRect/>
           </a:stretch>
         </p:blipFill>
-        <p:spPr bwMode="auto">
-          <a:xfrm>
-            <a:off x="6096000" y="2493603"/>
-            <a:ext cx="4781594" cy="4024045"/>
+        <p:spPr>
+          <a:xfrm>
+            <a:off x="6096000" y="2496842"/>
+            <a:ext cx="4892795" cy="4024046"/>
           </a:xfrm>
           <a:prstGeom prst="rect">
             <a:avLst/>
           </a:prstGeom>
-          <a:noFill/>
           <a:ln w="19050">
             <a:solidFill>
               <a:schemeClr val="tx1"/>
             </a:solidFill>
           </a:ln>
-          <a:extLst>
-            <a:ext uri="{909E8E84-426E-40DD-AFC4-6F175D3DCCD1}">
-              <a14:hiddenFill xmlns:a14="http://schemas.microsoft.com/office/drawing/2010/main">
-                <a:solidFill>
-                  <a:srgbClr val="FFFFFF"/>
-                </a:solidFill>
-              </a14:hiddenFill>
-            </a:ext>
-          </a:extLst>
         </p:spPr>
       </p:pic>
     </p:spTree>
@@ -5202,90 +5180,12 @@
           <a:chExt cx="0" cy="0"/>
         </a:xfrm>
       </p:grpSpPr>
-      <p:sp>
-        <p:nvSpPr>
-          <p:cNvPr id="4" name="Title 1">
-            <a:extLst>
-              <a:ext uri="{FF2B5EF4-FFF2-40B4-BE49-F238E27FC236}">
-                <a16:creationId xmlns:a16="http://schemas.microsoft.com/office/drawing/2014/main" id="{7FE8E56C-D8F1-4857-92A1-A28D505CD7D3}"/>
-              </a:ext>
-            </a:extLst>
-          </p:cNvPr>
-          <p:cNvSpPr>
-            <a:spLocks noGrp="1"/>
-          </p:cNvSpPr>
-          <p:nvPr>
-            <p:ph type="title"/>
-          </p:nvPr>
-        </p:nvSpPr>
-        <p:spPr>
-          <a:xfrm>
-            <a:off x="838200" y="365125"/>
-            <a:ext cx="10515600" cy="1325563"/>
-          </a:xfrm>
-        </p:spPr>
-        <p:txBody>
-          <a:bodyPr/>
-          <a:lstStyle/>
-          <a:p>
-            <a:r>
-              <a:rPr lang="en-US" dirty="0"/>
-              <a:t>Microburst &amp; Background Iso-MLT-L Plots</a:t>
-            </a:r>
-            <a:br>
-              <a:rPr lang="en-US" dirty="0"/>
-            </a:br>
-            <a:r>
-              <a:rPr lang="en-US" dirty="0"/>
-              <a:t>(cont’d)</a:t>
-            </a:r>
-          </a:p>
-        </p:txBody>
-      </p:sp>
-      <p:sp>
-        <p:nvSpPr>
-          <p:cNvPr id="5" name="Content Placeholder 2">
-            <a:extLst>
-              <a:ext uri="{FF2B5EF4-FFF2-40B4-BE49-F238E27FC236}">
-                <a16:creationId xmlns:a16="http://schemas.microsoft.com/office/drawing/2014/main" id="{F0CD88BD-E2C3-4E85-B566-570C4767CE90}"/>
-              </a:ext>
-            </a:extLst>
-          </p:cNvPr>
-          <p:cNvSpPr>
-            <a:spLocks noGrp="1"/>
-          </p:cNvSpPr>
-          <p:nvPr>
-            <p:ph idx="1"/>
-          </p:nvPr>
-        </p:nvSpPr>
-        <p:spPr>
-          <a:xfrm>
-            <a:off x="650123" y="1923279"/>
-            <a:ext cx="11288697" cy="775532"/>
-          </a:xfrm>
-        </p:spPr>
-        <p:txBody>
-          <a:bodyPr>
-            <a:normAutofit/>
-          </a:bodyPr>
-          <a:lstStyle/>
-          <a:p>
-            <a:pPr marL="0" indent="0">
-              <a:buNone/>
-            </a:pPr>
-            <a:r>
-              <a:rPr lang="en-US" dirty="0"/>
-              <a:t>1) Ratio					2) Difference</a:t>
-            </a:r>
-          </a:p>
-        </p:txBody>
-      </p:sp>
       <p:pic>
         <p:nvPicPr>
-          <p:cNvPr id="2050" name="Picture 2">
-            <a:extLst>
-              <a:ext uri="{FF2B5EF4-FFF2-40B4-BE49-F238E27FC236}">
-                <a16:creationId xmlns:a16="http://schemas.microsoft.com/office/drawing/2014/main" id="{64645628-D31E-4FDE-A092-FF5A2E30FB43}"/>
+          <p:cNvPr id="2052" name="Picture 4">
+            <a:extLst>
+              <a:ext uri="{FF2B5EF4-FFF2-40B4-BE49-F238E27FC236}">
+                <a16:creationId xmlns:a16="http://schemas.microsoft.com/office/drawing/2014/main" id="{A376732A-B0D0-4317-B444-859C2B715850}"/>
               </a:ext>
             </a:extLst>
           </p:cNvPr>
@@ -5309,8 +5209,8 @@
         </p:blipFill>
         <p:spPr bwMode="auto">
           <a:xfrm>
-            <a:off x="650123" y="2496842"/>
-            <a:ext cx="4838204" cy="4024885"/>
+            <a:off x="3652568" y="2496003"/>
+            <a:ext cx="4886864" cy="4024885"/>
           </a:xfrm>
           <a:prstGeom prst="rect">
             <a:avLst/>
@@ -5332,58 +5232,77 @@
           </a:extLst>
         </p:spPr>
       </p:pic>
-      <p:pic>
-        <p:nvPicPr>
-          <p:cNvPr id="2052" name="Picture 4">
-            <a:extLst>
-              <a:ext uri="{FF2B5EF4-FFF2-40B4-BE49-F238E27FC236}">
-                <a16:creationId xmlns:a16="http://schemas.microsoft.com/office/drawing/2014/main" id="{A376732A-B0D0-4317-B444-859C2B715850}"/>
-              </a:ext>
-            </a:extLst>
-          </p:cNvPr>
-          <p:cNvPicPr>
-            <a:picLocks noChangeAspect="1" noChangeArrowheads="1"/>
-          </p:cNvPicPr>
-          <p:nvPr/>
-        </p:nvPicPr>
-        <p:blipFill>
-          <a:blip r:embed="rId3">
-            <a:extLst>
-              <a:ext uri="{28A0092B-C50C-407E-A947-70E740481C1C}">
-                <a14:useLocalDpi xmlns:a14="http://schemas.microsoft.com/office/drawing/2010/main" val="0"/>
-              </a:ext>
-            </a:extLst>
-          </a:blip>
-          <a:srcRect/>
-          <a:stretch>
-            <a:fillRect/>
-          </a:stretch>
-        </p:blipFill>
-        <p:spPr bwMode="auto">
-          <a:xfrm>
-            <a:off x="6096000" y="2496841"/>
-            <a:ext cx="4886864" cy="4024885"/>
-          </a:xfrm>
-          <a:prstGeom prst="rect">
-            <a:avLst/>
-          </a:prstGeom>
-          <a:noFill/>
-          <a:ln w="19050">
-            <a:solidFill>
-              <a:schemeClr val="tx1"/>
-            </a:solidFill>
-          </a:ln>
-          <a:extLst>
-            <a:ext uri="{909E8E84-426E-40DD-AFC4-6F175D3DCCD1}">
-              <a14:hiddenFill xmlns:a14="http://schemas.microsoft.com/office/drawing/2010/main">
-                <a:solidFill>
-                  <a:srgbClr val="FFFFFF"/>
-                </a:solidFill>
-              </a14:hiddenFill>
-            </a:ext>
-          </a:extLst>
+      <p:sp>
+        <p:nvSpPr>
+          <p:cNvPr id="4" name="Title 1">
+            <a:extLst>
+              <a:ext uri="{FF2B5EF4-FFF2-40B4-BE49-F238E27FC236}">
+                <a16:creationId xmlns:a16="http://schemas.microsoft.com/office/drawing/2014/main" id="{7FE8E56C-D8F1-4857-92A1-A28D505CD7D3}"/>
+              </a:ext>
+            </a:extLst>
+          </p:cNvPr>
+          <p:cNvSpPr>
+            <a:spLocks noGrp="1"/>
+          </p:cNvSpPr>
+          <p:nvPr>
+            <p:ph type="title"/>
+          </p:nvPr>
+        </p:nvSpPr>
+        <p:spPr>
+          <a:xfrm>
+            <a:off x="838199" y="365125"/>
+            <a:ext cx="11353801" cy="1325563"/>
+          </a:xfrm>
         </p:spPr>
-      </p:pic>
+        <p:txBody>
+          <a:bodyPr/>
+          <a:lstStyle/>
+          <a:p>
+            <a:r>
+              <a:rPr lang="en-US" dirty="0"/>
+              <a:t>Microburst &amp; Background Iso-MLT-L Plots (cont’d)</a:t>
+            </a:r>
+          </a:p>
+        </p:txBody>
+      </p:sp>
+      <p:sp>
+        <p:nvSpPr>
+          <p:cNvPr id="5" name="Content Placeholder 2">
+            <a:extLst>
+              <a:ext uri="{FF2B5EF4-FFF2-40B4-BE49-F238E27FC236}">
+                <a16:creationId xmlns:a16="http://schemas.microsoft.com/office/drawing/2014/main" id="{F0CD88BD-E2C3-4E85-B566-570C4767CE90}"/>
+              </a:ext>
+            </a:extLst>
+          </p:cNvPr>
+          <p:cNvSpPr>
+            <a:spLocks noGrp="1"/>
+          </p:cNvSpPr>
+          <p:nvPr>
+            <p:ph idx="1"/>
+          </p:nvPr>
+        </p:nvSpPr>
+        <p:spPr>
+          <a:xfrm>
+            <a:off x="3652568" y="1923279"/>
+            <a:ext cx="5697411" cy="775532"/>
+          </a:xfrm>
+        </p:spPr>
+        <p:txBody>
+          <a:bodyPr>
+            <a:normAutofit/>
+          </a:bodyPr>
+          <a:lstStyle/>
+          <a:p>
+            <a:pPr marL="0" indent="0">
+              <a:buNone/>
+            </a:pPr>
+            <a:r>
+              <a:rPr lang="en-US" dirty="0"/>
+              <a:t>1) Difference</a:t>
+            </a:r>
+          </a:p>
+        </p:txBody>
+      </p:sp>
     </p:spTree>
     <p:extLst>
       <p:ext uri="{BB962C8B-B14F-4D97-AF65-F5344CB8AC3E}">

</xml_diff>

<commit_message>
Made small edits to code and added 1993 data folder
</commit_message>
<xml_diff>
--- a/sampexlib/Concept Summaries/LASP Research Summary.pptx
+++ b/sampexlib/Concept Summaries/LASP Research Summary.pptx
@@ -269,7 +269,7 @@
           <a:p>
             <a:fld id="{4E9E4D5A-70D9-49DB-B396-8E67F4DFB91A}" type="datetimeFigureOut">
               <a:rPr lang="en-US" smtClean="0"/>
-              <a:t>10/19/2021</a:t>
+              <a:t>10/26/2021</a:t>
             </a:fld>
             <a:endParaRPr lang="en-US"/>
           </a:p>
@@ -467,7 +467,7 @@
           <a:p>
             <a:fld id="{4E9E4D5A-70D9-49DB-B396-8E67F4DFB91A}" type="datetimeFigureOut">
               <a:rPr lang="en-US" smtClean="0"/>
-              <a:t>10/19/2021</a:t>
+              <a:t>10/26/2021</a:t>
             </a:fld>
             <a:endParaRPr lang="en-US"/>
           </a:p>
@@ -675,7 +675,7 @@
           <a:p>
             <a:fld id="{4E9E4D5A-70D9-49DB-B396-8E67F4DFB91A}" type="datetimeFigureOut">
               <a:rPr lang="en-US" smtClean="0"/>
-              <a:t>10/19/2021</a:t>
+              <a:t>10/26/2021</a:t>
             </a:fld>
             <a:endParaRPr lang="en-US"/>
           </a:p>
@@ -873,7 +873,7 @@
           <a:p>
             <a:fld id="{4E9E4D5A-70D9-49DB-B396-8E67F4DFB91A}" type="datetimeFigureOut">
               <a:rPr lang="en-US" smtClean="0"/>
-              <a:t>10/19/2021</a:t>
+              <a:t>10/26/2021</a:t>
             </a:fld>
             <a:endParaRPr lang="en-US"/>
           </a:p>
@@ -1148,7 +1148,7 @@
           <a:p>
             <a:fld id="{4E9E4D5A-70D9-49DB-B396-8E67F4DFB91A}" type="datetimeFigureOut">
               <a:rPr lang="en-US" smtClean="0"/>
-              <a:t>10/19/2021</a:t>
+              <a:t>10/26/2021</a:t>
             </a:fld>
             <a:endParaRPr lang="en-US"/>
           </a:p>
@@ -1413,7 +1413,7 @@
           <a:p>
             <a:fld id="{4E9E4D5A-70D9-49DB-B396-8E67F4DFB91A}" type="datetimeFigureOut">
               <a:rPr lang="en-US" smtClean="0"/>
-              <a:t>10/19/2021</a:t>
+              <a:t>10/26/2021</a:t>
             </a:fld>
             <a:endParaRPr lang="en-US"/>
           </a:p>
@@ -1825,7 +1825,7 @@
           <a:p>
             <a:fld id="{4E9E4D5A-70D9-49DB-B396-8E67F4DFB91A}" type="datetimeFigureOut">
               <a:rPr lang="en-US" smtClean="0"/>
-              <a:t>10/19/2021</a:t>
+              <a:t>10/26/2021</a:t>
             </a:fld>
             <a:endParaRPr lang="en-US"/>
           </a:p>
@@ -1966,7 +1966,7 @@
           <a:p>
             <a:fld id="{4E9E4D5A-70D9-49DB-B396-8E67F4DFB91A}" type="datetimeFigureOut">
               <a:rPr lang="en-US" smtClean="0"/>
-              <a:t>10/19/2021</a:t>
+              <a:t>10/26/2021</a:t>
             </a:fld>
             <a:endParaRPr lang="en-US"/>
           </a:p>
@@ -2079,7 +2079,7 @@
           <a:p>
             <a:fld id="{4E9E4D5A-70D9-49DB-B396-8E67F4DFB91A}" type="datetimeFigureOut">
               <a:rPr lang="en-US" smtClean="0"/>
-              <a:t>10/19/2021</a:t>
+              <a:t>10/26/2021</a:t>
             </a:fld>
             <a:endParaRPr lang="en-US"/>
           </a:p>
@@ -2390,7 +2390,7 @@
           <a:p>
             <a:fld id="{4E9E4D5A-70D9-49DB-B396-8E67F4DFB91A}" type="datetimeFigureOut">
               <a:rPr lang="en-US" smtClean="0"/>
-              <a:t>10/19/2021</a:t>
+              <a:t>10/26/2021</a:t>
             </a:fld>
             <a:endParaRPr lang="en-US"/>
           </a:p>
@@ -2678,7 +2678,7 @@
           <a:p>
             <a:fld id="{4E9E4D5A-70D9-49DB-B396-8E67F4DFB91A}" type="datetimeFigureOut">
               <a:rPr lang="en-US" smtClean="0"/>
-              <a:t>10/19/2021</a:t>
+              <a:t>10/26/2021</a:t>
             </a:fld>
             <a:endParaRPr lang="en-US"/>
           </a:p>
@@ -2919,7 +2919,7 @@
           <a:p>
             <a:fld id="{4E9E4D5A-70D9-49DB-B396-8E67F4DFB91A}" type="datetimeFigureOut">
               <a:rPr lang="en-US" smtClean="0"/>
-              <a:t>10/19/2021</a:t>
+              <a:t>10/26/2021</a:t>
             </a:fld>
             <a:endParaRPr lang="en-US"/>
           </a:p>

</xml_diff>

<commit_message>
Created Iso vs AE 2D-hist
</commit_message>
<xml_diff>
--- a/sampexlib/Concept Summaries/LASP Research Summary.pptx
+++ b/sampexlib/Concept Summaries/LASP Research Summary.pptx
@@ -269,7 +269,7 @@
           <a:p>
             <a:fld id="{4E9E4D5A-70D9-49DB-B396-8E67F4DFB91A}" type="datetimeFigureOut">
               <a:rPr lang="en-US" smtClean="0"/>
-              <a:t>10/26/2021</a:t>
+              <a:t>10/28/2021</a:t>
             </a:fld>
             <a:endParaRPr lang="en-US"/>
           </a:p>
@@ -467,7 +467,7 @@
           <a:p>
             <a:fld id="{4E9E4D5A-70D9-49DB-B396-8E67F4DFB91A}" type="datetimeFigureOut">
               <a:rPr lang="en-US" smtClean="0"/>
-              <a:t>10/26/2021</a:t>
+              <a:t>10/28/2021</a:t>
             </a:fld>
             <a:endParaRPr lang="en-US"/>
           </a:p>
@@ -675,7 +675,7 @@
           <a:p>
             <a:fld id="{4E9E4D5A-70D9-49DB-B396-8E67F4DFB91A}" type="datetimeFigureOut">
               <a:rPr lang="en-US" smtClean="0"/>
-              <a:t>10/26/2021</a:t>
+              <a:t>10/28/2021</a:t>
             </a:fld>
             <a:endParaRPr lang="en-US"/>
           </a:p>
@@ -873,7 +873,7 @@
           <a:p>
             <a:fld id="{4E9E4D5A-70D9-49DB-B396-8E67F4DFB91A}" type="datetimeFigureOut">
               <a:rPr lang="en-US" smtClean="0"/>
-              <a:t>10/26/2021</a:t>
+              <a:t>10/28/2021</a:t>
             </a:fld>
             <a:endParaRPr lang="en-US"/>
           </a:p>
@@ -1148,7 +1148,7 @@
           <a:p>
             <a:fld id="{4E9E4D5A-70D9-49DB-B396-8E67F4DFB91A}" type="datetimeFigureOut">
               <a:rPr lang="en-US" smtClean="0"/>
-              <a:t>10/26/2021</a:t>
+              <a:t>10/28/2021</a:t>
             </a:fld>
             <a:endParaRPr lang="en-US"/>
           </a:p>
@@ -1413,7 +1413,7 @@
           <a:p>
             <a:fld id="{4E9E4D5A-70D9-49DB-B396-8E67F4DFB91A}" type="datetimeFigureOut">
               <a:rPr lang="en-US" smtClean="0"/>
-              <a:t>10/26/2021</a:t>
+              <a:t>10/28/2021</a:t>
             </a:fld>
             <a:endParaRPr lang="en-US"/>
           </a:p>
@@ -1825,7 +1825,7 @@
           <a:p>
             <a:fld id="{4E9E4D5A-70D9-49DB-B396-8E67F4DFB91A}" type="datetimeFigureOut">
               <a:rPr lang="en-US" smtClean="0"/>
-              <a:t>10/26/2021</a:t>
+              <a:t>10/28/2021</a:t>
             </a:fld>
             <a:endParaRPr lang="en-US"/>
           </a:p>
@@ -1966,7 +1966,7 @@
           <a:p>
             <a:fld id="{4E9E4D5A-70D9-49DB-B396-8E67F4DFB91A}" type="datetimeFigureOut">
               <a:rPr lang="en-US" smtClean="0"/>
-              <a:t>10/26/2021</a:t>
+              <a:t>10/28/2021</a:t>
             </a:fld>
             <a:endParaRPr lang="en-US"/>
           </a:p>
@@ -2079,7 +2079,7 @@
           <a:p>
             <a:fld id="{4E9E4D5A-70D9-49DB-B396-8E67F4DFB91A}" type="datetimeFigureOut">
               <a:rPr lang="en-US" smtClean="0"/>
-              <a:t>10/26/2021</a:t>
+              <a:t>10/28/2021</a:t>
             </a:fld>
             <a:endParaRPr lang="en-US"/>
           </a:p>
@@ -2390,7 +2390,7 @@
           <a:p>
             <a:fld id="{4E9E4D5A-70D9-49DB-B396-8E67F4DFB91A}" type="datetimeFigureOut">
               <a:rPr lang="en-US" smtClean="0"/>
-              <a:t>10/26/2021</a:t>
+              <a:t>10/28/2021</a:t>
             </a:fld>
             <a:endParaRPr lang="en-US"/>
           </a:p>
@@ -2678,7 +2678,7 @@
           <a:p>
             <a:fld id="{4E9E4D5A-70D9-49DB-B396-8E67F4DFB91A}" type="datetimeFigureOut">
               <a:rPr lang="en-US" smtClean="0"/>
-              <a:t>10/26/2021</a:t>
+              <a:t>10/28/2021</a:t>
             </a:fld>
             <a:endParaRPr lang="en-US"/>
           </a:p>
@@ -2919,7 +2919,7 @@
           <a:p>
             <a:fld id="{4E9E4D5A-70D9-49DB-B396-8E67F4DFB91A}" type="datetimeFigureOut">
               <a:rPr lang="en-US" smtClean="0"/>
-              <a:t>10/26/2021</a:t>
+              <a:t>10/28/2021</a:t>
             </a:fld>
             <a:endParaRPr lang="en-US"/>
           </a:p>
@@ -4179,36 +4179,41 @@
           <a:chExt cx="0" cy="0"/>
         </a:xfrm>
       </p:grpSpPr>
-      <p:sp>
-        <p:nvSpPr>
-          <p:cNvPr id="3" name="Content Placeholder 2">
-            <a:extLst>
-              <a:ext uri="{FF2B5EF4-FFF2-40B4-BE49-F238E27FC236}">
-                <a16:creationId xmlns:a16="http://schemas.microsoft.com/office/drawing/2014/main" id="{748C4E64-8A04-445A-9180-671A65EE74C8}"/>
-              </a:ext>
-            </a:extLst>
-          </p:cNvPr>
-          <p:cNvSpPr>
-            <a:spLocks noGrp="1"/>
-          </p:cNvSpPr>
+      <p:pic>
+        <p:nvPicPr>
+          <p:cNvPr id="4" name="Content Placeholder 3">
+            <a:extLst>
+              <a:ext uri="{FF2B5EF4-FFF2-40B4-BE49-F238E27FC236}">
+                <a16:creationId xmlns:a16="http://schemas.microsoft.com/office/drawing/2014/main" id="{580545C1-E7D2-4919-998E-9DBCF002D64D}"/>
+              </a:ext>
+            </a:extLst>
+          </p:cNvPr>
+          <p:cNvPicPr>
+            <a:picLocks noGrp="1" noChangeAspect="1"/>
+          </p:cNvPicPr>
           <p:nvPr>
             <p:ph idx="1"/>
           </p:nvPr>
-        </p:nvSpPr>
+        </p:nvPicPr>
+        <p:blipFill>
+          <a:blip r:embed="rId2">
+            <a:extLst>
+              <a:ext uri="{28A0092B-C50C-407E-A947-70E740481C1C}">
+                <a14:useLocalDpi xmlns:a14="http://schemas.microsoft.com/office/drawing/2010/main" val="0"/>
+              </a:ext>
+            </a:extLst>
+          </a:blip>
+          <a:stretch>
+            <a:fillRect/>
+          </a:stretch>
+        </p:blipFill>
         <p:spPr>
           <a:xfrm>
-            <a:off x="713913" y="1378174"/>
-            <a:ext cx="4852386" cy="4312412"/>
-          </a:xfrm>
-        </p:spPr>
-        <p:txBody>
-          <a:bodyPr/>
-          <a:lstStyle/>
-          <a:p>
-            <a:endParaRPr lang="en-US"/>
-          </a:p>
-        </p:txBody>
-      </p:sp>
+            <a:off x="6728950" y="282562"/>
+            <a:ext cx="4314130" cy="3146438"/>
+          </a:xfrm>
+        </p:spPr>
+      </p:pic>
       <p:sp>
         <p:nvSpPr>
           <p:cNvPr id="6" name="Title 1">
@@ -4264,6 +4269,215 @@
           </a:p>
         </p:txBody>
       </p:sp>
+      <p:pic>
+        <p:nvPicPr>
+          <p:cNvPr id="9" name="Picture 8">
+            <a:extLst>
+              <a:ext uri="{FF2B5EF4-FFF2-40B4-BE49-F238E27FC236}">
+                <a16:creationId xmlns:a16="http://schemas.microsoft.com/office/drawing/2014/main" id="{4E00DFFD-2B7D-40E1-AEBD-4F676B69D999}"/>
+              </a:ext>
+            </a:extLst>
+          </p:cNvPr>
+          <p:cNvPicPr>
+            <a:picLocks noChangeAspect="1"/>
+          </p:cNvPicPr>
+          <p:nvPr/>
+        </p:nvPicPr>
+        <p:blipFill>
+          <a:blip r:embed="rId3">
+            <a:extLst>
+              <a:ext uri="{28A0092B-C50C-407E-A947-70E740481C1C}">
+                <a14:useLocalDpi xmlns:a14="http://schemas.microsoft.com/office/drawing/2010/main" val="0"/>
+              </a:ext>
+            </a:extLst>
+          </a:blip>
+          <a:stretch>
+            <a:fillRect/>
+          </a:stretch>
+        </p:blipFill>
+        <p:spPr>
+          <a:xfrm>
+            <a:off x="6096000" y="3953573"/>
+            <a:ext cx="4713869" cy="2554927"/>
+          </a:xfrm>
+          <a:prstGeom prst="rect">
+            <a:avLst/>
+          </a:prstGeom>
+        </p:spPr>
+      </p:pic>
+      <p:sp>
+        <p:nvSpPr>
+          <p:cNvPr id="11" name="TextBox 10">
+            <a:extLst>
+              <a:ext uri="{FF2B5EF4-FFF2-40B4-BE49-F238E27FC236}">
+                <a16:creationId xmlns:a16="http://schemas.microsoft.com/office/drawing/2014/main" id="{8A0DE8A2-FE24-4E7C-945A-BD8D5CB6A55E}"/>
+              </a:ext>
+            </a:extLst>
+          </p:cNvPr>
+          <p:cNvSpPr txBox="1"/>
+          <p:nvPr/>
+        </p:nvSpPr>
+        <p:spPr>
+          <a:xfrm>
+            <a:off x="9979844" y="3568176"/>
+            <a:ext cx="939690" cy="246221"/>
+          </a:xfrm>
+          <a:prstGeom prst="rect">
+            <a:avLst/>
+          </a:prstGeom>
+          <a:noFill/>
+        </p:spPr>
+        <p:txBody>
+          <a:bodyPr wrap="square">
+            <a:spAutoFit/>
+          </a:bodyPr>
+          <a:lstStyle/>
+          <a:p>
+            <a:r>
+              <a:rPr lang="en-US" sz="1000" dirty="0"/>
+              <a:t>(From NASA)</a:t>
+            </a:r>
+          </a:p>
+        </p:txBody>
+      </p:sp>
+      <p:sp>
+        <p:nvSpPr>
+          <p:cNvPr id="12" name="TextBox 11">
+            <a:extLst>
+              <a:ext uri="{FF2B5EF4-FFF2-40B4-BE49-F238E27FC236}">
+                <a16:creationId xmlns:a16="http://schemas.microsoft.com/office/drawing/2014/main" id="{24967E5F-C8D4-415F-AA12-8C810E8815BE}"/>
+              </a:ext>
+            </a:extLst>
+          </p:cNvPr>
+          <p:cNvSpPr txBox="1"/>
+          <p:nvPr/>
+        </p:nvSpPr>
+        <p:spPr>
+          <a:xfrm>
+            <a:off x="9430909" y="6452327"/>
+            <a:ext cx="1701690" cy="246221"/>
+          </a:xfrm>
+          <a:prstGeom prst="rect">
+            <a:avLst/>
+          </a:prstGeom>
+          <a:noFill/>
+        </p:spPr>
+        <p:txBody>
+          <a:bodyPr wrap="square">
+            <a:spAutoFit/>
+          </a:bodyPr>
+          <a:lstStyle/>
+          <a:p>
+            <a:r>
+              <a:rPr lang="en-US" sz="1000" dirty="0"/>
+              <a:t>(From Blum et al, 2015)</a:t>
+            </a:r>
+          </a:p>
+        </p:txBody>
+      </p:sp>
+      <p:grpSp>
+        <p:nvGrpSpPr>
+          <p:cNvPr id="15" name="Group 14">
+            <a:extLst>
+              <a:ext uri="{FF2B5EF4-FFF2-40B4-BE49-F238E27FC236}">
+                <a16:creationId xmlns:a16="http://schemas.microsoft.com/office/drawing/2014/main" id="{0AA8BA05-6E58-4227-93AB-D4943D45D30D}"/>
+              </a:ext>
+            </a:extLst>
+          </p:cNvPr>
+          <p:cNvGrpSpPr/>
+          <p:nvPr/>
+        </p:nvGrpSpPr>
+        <p:grpSpPr>
+          <a:xfrm>
+            <a:off x="2183907" y="3124941"/>
+            <a:ext cx="3052907" cy="3079468"/>
+            <a:chOff x="3089428" y="4324602"/>
+            <a:chExt cx="2387083" cy="2250835"/>
+          </a:xfrm>
+        </p:grpSpPr>
+        <p:pic>
+          <p:nvPicPr>
+            <p:cNvPr id="13" name="Picture 2">
+              <a:extLst>
+                <a:ext uri="{FF2B5EF4-FFF2-40B4-BE49-F238E27FC236}">
+                  <a16:creationId xmlns:a16="http://schemas.microsoft.com/office/drawing/2014/main" id="{B69C7754-D288-437A-A594-E20D1142FE64}"/>
+                </a:ext>
+              </a:extLst>
+            </p:cNvPr>
+            <p:cNvPicPr>
+              <a:picLocks noChangeAspect="1" noChangeArrowheads="1"/>
+            </p:cNvPicPr>
+            <p:nvPr/>
+          </p:nvPicPr>
+          <p:blipFill rotWithShape="1">
+            <a:blip r:embed="rId4">
+              <a:extLst>
+                <a:ext uri="{28A0092B-C50C-407E-A947-70E740481C1C}">
+                  <a14:useLocalDpi xmlns:a14="http://schemas.microsoft.com/office/drawing/2010/main" val="0"/>
+                </a:ext>
+              </a:extLst>
+            </a:blip>
+            <a:srcRect l="50722" t="48562"/>
+            <a:stretch/>
+          </p:blipFill>
+          <p:spPr bwMode="auto">
+            <a:xfrm>
+              <a:off x="3089428" y="4505502"/>
+              <a:ext cx="2387083" cy="2069935"/>
+            </a:xfrm>
+            <a:prstGeom prst="rect">
+              <a:avLst/>
+            </a:prstGeom>
+            <a:noFill/>
+            <a:ln w="19050">
+              <a:noFill/>
+            </a:ln>
+            <a:extLst>
+              <a:ext uri="{909E8E84-426E-40DD-AFC4-6F175D3DCCD1}">
+                <a14:hiddenFill xmlns:a14="http://schemas.microsoft.com/office/drawing/2010/main">
+                  <a:solidFill>
+                    <a:srgbClr val="FFFFFF"/>
+                  </a:solidFill>
+                </a14:hiddenFill>
+              </a:ext>
+            </a:extLst>
+          </p:spPr>
+        </p:pic>
+        <p:sp>
+          <p:nvSpPr>
+            <p:cNvPr id="14" name="TextBox 13">
+              <a:extLst>
+                <a:ext uri="{FF2B5EF4-FFF2-40B4-BE49-F238E27FC236}">
+                  <a16:creationId xmlns:a16="http://schemas.microsoft.com/office/drawing/2014/main" id="{5E584F7E-6409-496C-B6AB-94C76C453F21}"/>
+                </a:ext>
+              </a:extLst>
+            </p:cNvPr>
+            <p:cNvSpPr txBox="1"/>
+            <p:nvPr/>
+          </p:nvSpPr>
+          <p:spPr>
+            <a:xfrm>
+              <a:off x="3779765" y="4324602"/>
+              <a:ext cx="765603" cy="246221"/>
+            </a:xfrm>
+            <a:prstGeom prst="rect">
+              <a:avLst/>
+            </a:prstGeom>
+            <a:solidFill>
+              <a:schemeClr val="bg1"/>
+            </a:solidFill>
+          </p:spPr>
+          <p:txBody>
+            <a:bodyPr wrap="square">
+              <a:spAutoFit/>
+            </a:bodyPr>
+            <a:lstStyle/>
+            <a:p>
+              <a:endParaRPr lang="en-US" sz="1000" dirty="0"/>
+            </a:p>
+          </p:txBody>
+        </p:sp>
+      </p:grpSp>
     </p:spTree>
     <p:extLst>
       <p:ext uri="{BB962C8B-B14F-4D97-AF65-F5344CB8AC3E}">

</xml_diff>

<commit_message>
Made edits to isotropy vs AE/Dst plots
</commit_message>
<xml_diff>
--- a/sampexlib/Concept Summaries/LASP Research Summary.pptx
+++ b/sampexlib/Concept Summaries/LASP Research Summary.pptx
@@ -269,7 +269,7 @@
           <a:p>
             <a:fld id="{4E9E4D5A-70D9-49DB-B396-8E67F4DFB91A}" type="datetimeFigureOut">
               <a:rPr lang="en-US" smtClean="0"/>
-              <a:t>10/28/2021</a:t>
+              <a:t>11/10/2021</a:t>
             </a:fld>
             <a:endParaRPr lang="en-US"/>
           </a:p>
@@ -467,7 +467,7 @@
           <a:p>
             <a:fld id="{4E9E4D5A-70D9-49DB-B396-8E67F4DFB91A}" type="datetimeFigureOut">
               <a:rPr lang="en-US" smtClean="0"/>
-              <a:t>10/28/2021</a:t>
+              <a:t>11/10/2021</a:t>
             </a:fld>
             <a:endParaRPr lang="en-US"/>
           </a:p>
@@ -675,7 +675,7 @@
           <a:p>
             <a:fld id="{4E9E4D5A-70D9-49DB-B396-8E67F4DFB91A}" type="datetimeFigureOut">
               <a:rPr lang="en-US" smtClean="0"/>
-              <a:t>10/28/2021</a:t>
+              <a:t>11/10/2021</a:t>
             </a:fld>
             <a:endParaRPr lang="en-US"/>
           </a:p>
@@ -873,7 +873,7 @@
           <a:p>
             <a:fld id="{4E9E4D5A-70D9-49DB-B396-8E67F4DFB91A}" type="datetimeFigureOut">
               <a:rPr lang="en-US" smtClean="0"/>
-              <a:t>10/28/2021</a:t>
+              <a:t>11/10/2021</a:t>
             </a:fld>
             <a:endParaRPr lang="en-US"/>
           </a:p>
@@ -1148,7 +1148,7 @@
           <a:p>
             <a:fld id="{4E9E4D5A-70D9-49DB-B396-8E67F4DFB91A}" type="datetimeFigureOut">
               <a:rPr lang="en-US" smtClean="0"/>
-              <a:t>10/28/2021</a:t>
+              <a:t>11/10/2021</a:t>
             </a:fld>
             <a:endParaRPr lang="en-US"/>
           </a:p>
@@ -1413,7 +1413,7 @@
           <a:p>
             <a:fld id="{4E9E4D5A-70D9-49DB-B396-8E67F4DFB91A}" type="datetimeFigureOut">
               <a:rPr lang="en-US" smtClean="0"/>
-              <a:t>10/28/2021</a:t>
+              <a:t>11/10/2021</a:t>
             </a:fld>
             <a:endParaRPr lang="en-US"/>
           </a:p>
@@ -1825,7 +1825,7 @@
           <a:p>
             <a:fld id="{4E9E4D5A-70D9-49DB-B396-8E67F4DFB91A}" type="datetimeFigureOut">
               <a:rPr lang="en-US" smtClean="0"/>
-              <a:t>10/28/2021</a:t>
+              <a:t>11/10/2021</a:t>
             </a:fld>
             <a:endParaRPr lang="en-US"/>
           </a:p>
@@ -1966,7 +1966,7 @@
           <a:p>
             <a:fld id="{4E9E4D5A-70D9-49DB-B396-8E67F4DFB91A}" type="datetimeFigureOut">
               <a:rPr lang="en-US" smtClean="0"/>
-              <a:t>10/28/2021</a:t>
+              <a:t>11/10/2021</a:t>
             </a:fld>
             <a:endParaRPr lang="en-US"/>
           </a:p>
@@ -2079,7 +2079,7 @@
           <a:p>
             <a:fld id="{4E9E4D5A-70D9-49DB-B396-8E67F4DFB91A}" type="datetimeFigureOut">
               <a:rPr lang="en-US" smtClean="0"/>
-              <a:t>10/28/2021</a:t>
+              <a:t>11/10/2021</a:t>
             </a:fld>
             <a:endParaRPr lang="en-US"/>
           </a:p>
@@ -2390,7 +2390,7 @@
           <a:p>
             <a:fld id="{4E9E4D5A-70D9-49DB-B396-8E67F4DFB91A}" type="datetimeFigureOut">
               <a:rPr lang="en-US" smtClean="0"/>
-              <a:t>10/28/2021</a:t>
+              <a:t>11/10/2021</a:t>
             </a:fld>
             <a:endParaRPr lang="en-US"/>
           </a:p>
@@ -2678,7 +2678,7 @@
           <a:p>
             <a:fld id="{4E9E4D5A-70D9-49DB-B396-8E67F4DFB91A}" type="datetimeFigureOut">
               <a:rPr lang="en-US" smtClean="0"/>
-              <a:t>10/28/2021</a:t>
+              <a:t>11/10/2021</a:t>
             </a:fld>
             <a:endParaRPr lang="en-US"/>
           </a:p>
@@ -2919,7 +2919,7 @@
           <a:p>
             <a:fld id="{4E9E4D5A-70D9-49DB-B396-8E67F4DFB91A}" type="datetimeFigureOut">
               <a:rPr lang="en-US" smtClean="0"/>
-              <a:t>10/28/2021</a:t>
+              <a:t>11/10/2021</a:t>
             </a:fld>
             <a:endParaRPr lang="en-US"/>
           </a:p>
@@ -5396,15 +5396,15 @@
       </p:grpSpPr>
       <p:pic>
         <p:nvPicPr>
-          <p:cNvPr id="2052" name="Picture 4">
-            <a:extLst>
-              <a:ext uri="{FF2B5EF4-FFF2-40B4-BE49-F238E27FC236}">
-                <a16:creationId xmlns:a16="http://schemas.microsoft.com/office/drawing/2014/main" id="{A376732A-B0D0-4317-B444-859C2B715850}"/>
+          <p:cNvPr id="3" name="Picture 2">
+            <a:extLst>
+              <a:ext uri="{FF2B5EF4-FFF2-40B4-BE49-F238E27FC236}">
+                <a16:creationId xmlns:a16="http://schemas.microsoft.com/office/drawing/2014/main" id="{DC9754A1-32B6-4962-A163-4659F7178798}"/>
               </a:ext>
             </a:extLst>
           </p:cNvPr>
           <p:cNvPicPr>
-            <a:picLocks noChangeAspect="1" noChangeArrowheads="1"/>
+            <a:picLocks noChangeAspect="1"/>
           </p:cNvPicPr>
           <p:nvPr/>
         </p:nvPicPr>
@@ -5416,12 +5416,11 @@
               </a:ext>
             </a:extLst>
           </a:blip>
-          <a:srcRect/>
           <a:stretch>
             <a:fillRect/>
           </a:stretch>
         </p:blipFill>
-        <p:spPr bwMode="auto">
+        <p:spPr>
           <a:xfrm>
             <a:off x="3652568" y="2496003"/>
             <a:ext cx="4886864" cy="4024885"/>
@@ -5429,21 +5428,6 @@
           <a:prstGeom prst="rect">
             <a:avLst/>
           </a:prstGeom>
-          <a:noFill/>
-          <a:ln w="19050">
-            <a:solidFill>
-              <a:schemeClr val="tx1"/>
-            </a:solidFill>
-          </a:ln>
-          <a:extLst>
-            <a:ext uri="{909E8E84-426E-40DD-AFC4-6F175D3DCCD1}">
-              <a14:hiddenFill xmlns:a14="http://schemas.microsoft.com/office/drawing/2010/main">
-                <a:solidFill>
-                  <a:srgbClr val="FFFFFF"/>
-                </a:solidFill>
-              </a14:hiddenFill>
-            </a:ext>
-          </a:extLst>
         </p:spPr>
       </p:pic>
       <p:sp>

</xml_diff>

<commit_message>
Changed iso vs AE plots
</commit_message>
<xml_diff>
--- a/sampexlib/Concept Summaries/LASP Research Summary.pptx
+++ b/sampexlib/Concept Summaries/LASP Research Summary.pptx
@@ -269,7 +269,7 @@
           <a:p>
             <a:fld id="{4E9E4D5A-70D9-49DB-B396-8E67F4DFB91A}" type="datetimeFigureOut">
               <a:rPr lang="en-US" smtClean="0"/>
-              <a:t>11/10/2021</a:t>
+              <a:t>11/19/2021</a:t>
             </a:fld>
             <a:endParaRPr lang="en-US"/>
           </a:p>
@@ -467,7 +467,7 @@
           <a:p>
             <a:fld id="{4E9E4D5A-70D9-49DB-B396-8E67F4DFB91A}" type="datetimeFigureOut">
               <a:rPr lang="en-US" smtClean="0"/>
-              <a:t>11/10/2021</a:t>
+              <a:t>11/19/2021</a:t>
             </a:fld>
             <a:endParaRPr lang="en-US"/>
           </a:p>
@@ -675,7 +675,7 @@
           <a:p>
             <a:fld id="{4E9E4D5A-70D9-49DB-B396-8E67F4DFB91A}" type="datetimeFigureOut">
               <a:rPr lang="en-US" smtClean="0"/>
-              <a:t>11/10/2021</a:t>
+              <a:t>11/19/2021</a:t>
             </a:fld>
             <a:endParaRPr lang="en-US"/>
           </a:p>
@@ -873,7 +873,7 @@
           <a:p>
             <a:fld id="{4E9E4D5A-70D9-49DB-B396-8E67F4DFB91A}" type="datetimeFigureOut">
               <a:rPr lang="en-US" smtClean="0"/>
-              <a:t>11/10/2021</a:t>
+              <a:t>11/19/2021</a:t>
             </a:fld>
             <a:endParaRPr lang="en-US"/>
           </a:p>
@@ -1148,7 +1148,7 @@
           <a:p>
             <a:fld id="{4E9E4D5A-70D9-49DB-B396-8E67F4DFB91A}" type="datetimeFigureOut">
               <a:rPr lang="en-US" smtClean="0"/>
-              <a:t>11/10/2021</a:t>
+              <a:t>11/19/2021</a:t>
             </a:fld>
             <a:endParaRPr lang="en-US"/>
           </a:p>
@@ -1413,7 +1413,7 @@
           <a:p>
             <a:fld id="{4E9E4D5A-70D9-49DB-B396-8E67F4DFB91A}" type="datetimeFigureOut">
               <a:rPr lang="en-US" smtClean="0"/>
-              <a:t>11/10/2021</a:t>
+              <a:t>11/19/2021</a:t>
             </a:fld>
             <a:endParaRPr lang="en-US"/>
           </a:p>
@@ -1825,7 +1825,7 @@
           <a:p>
             <a:fld id="{4E9E4D5A-70D9-49DB-B396-8E67F4DFB91A}" type="datetimeFigureOut">
               <a:rPr lang="en-US" smtClean="0"/>
-              <a:t>11/10/2021</a:t>
+              <a:t>11/19/2021</a:t>
             </a:fld>
             <a:endParaRPr lang="en-US"/>
           </a:p>
@@ -1966,7 +1966,7 @@
           <a:p>
             <a:fld id="{4E9E4D5A-70D9-49DB-B396-8E67F4DFB91A}" type="datetimeFigureOut">
               <a:rPr lang="en-US" smtClean="0"/>
-              <a:t>11/10/2021</a:t>
+              <a:t>11/19/2021</a:t>
             </a:fld>
             <a:endParaRPr lang="en-US"/>
           </a:p>
@@ -2079,7 +2079,7 @@
           <a:p>
             <a:fld id="{4E9E4D5A-70D9-49DB-B396-8E67F4DFB91A}" type="datetimeFigureOut">
               <a:rPr lang="en-US" smtClean="0"/>
-              <a:t>11/10/2021</a:t>
+              <a:t>11/19/2021</a:t>
             </a:fld>
             <a:endParaRPr lang="en-US"/>
           </a:p>
@@ -2390,7 +2390,7 @@
           <a:p>
             <a:fld id="{4E9E4D5A-70D9-49DB-B396-8E67F4DFB91A}" type="datetimeFigureOut">
               <a:rPr lang="en-US" smtClean="0"/>
-              <a:t>11/10/2021</a:t>
+              <a:t>11/19/2021</a:t>
             </a:fld>
             <a:endParaRPr lang="en-US"/>
           </a:p>
@@ -2678,7 +2678,7 @@
           <a:p>
             <a:fld id="{4E9E4D5A-70D9-49DB-B396-8E67F4DFB91A}" type="datetimeFigureOut">
               <a:rPr lang="en-US" smtClean="0"/>
-              <a:t>11/10/2021</a:t>
+              <a:t>11/19/2021</a:t>
             </a:fld>
             <a:endParaRPr lang="en-US"/>
           </a:p>
@@ -2919,7 +2919,7 @@
           <a:p>
             <a:fld id="{4E9E4D5A-70D9-49DB-B396-8E67F4DFB91A}" type="datetimeFigureOut">
               <a:rPr lang="en-US" smtClean="0"/>
-              <a:t>11/10/2021</a:t>
+              <a:t>11/19/2021</a:t>
             </a:fld>
             <a:endParaRPr lang="en-US"/>
           </a:p>
@@ -4964,34 +4964,6 @@
           <a:chExt cx="0" cy="0"/>
         </a:xfrm>
       </p:grpSpPr>
-      <p:sp>
-        <p:nvSpPr>
-          <p:cNvPr id="2" name="Title 1">
-            <a:extLst>
-              <a:ext uri="{FF2B5EF4-FFF2-40B4-BE49-F238E27FC236}">
-                <a16:creationId xmlns:a16="http://schemas.microsoft.com/office/drawing/2014/main" id="{AD2F7024-0C31-4671-AA2C-FB0942EF7D9E}"/>
-              </a:ext>
-            </a:extLst>
-          </p:cNvPr>
-          <p:cNvSpPr>
-            <a:spLocks noGrp="1"/>
-          </p:cNvSpPr>
-          <p:nvPr>
-            <p:ph type="title"/>
-          </p:nvPr>
-        </p:nvSpPr>
-        <p:spPr/>
-        <p:txBody>
-          <a:bodyPr/>
-          <a:lstStyle/>
-          <a:p>
-            <a:r>
-              <a:rPr lang="en-US" dirty="0"/>
-              <a:t>Microburst &amp; Background Iso Correlations</a:t>
-            </a:r>
-          </a:p>
-        </p:txBody>
-      </p:sp>
       <p:pic>
         <p:nvPicPr>
           <p:cNvPr id="1026" name="Picture 2">
@@ -5021,8 +4993,8 @@
         </p:blipFill>
         <p:spPr bwMode="auto">
           <a:xfrm>
-            <a:off x="318075" y="2629177"/>
-            <a:ext cx="3481567" cy="3739525"/>
+            <a:off x="383287" y="676751"/>
+            <a:ext cx="5322569" cy="5716932"/>
           </a:xfrm>
           <a:prstGeom prst="rect">
             <a:avLst/>
@@ -5073,8 +5045,8 @@
         </p:blipFill>
         <p:spPr bwMode="auto">
           <a:xfrm>
-            <a:off x="4296918" y="2601775"/>
-            <a:ext cx="3481567" cy="3744180"/>
+            <a:off x="5932243" y="676751"/>
+            <a:ext cx="5322570" cy="5724049"/>
           </a:xfrm>
           <a:prstGeom prst="rect">
             <a:avLst/>
@@ -5096,96 +5068,6 @@
           </a:extLst>
         </p:spPr>
       </p:pic>
-      <p:pic>
-        <p:nvPicPr>
-          <p:cNvPr id="1030" name="Picture 6">
-            <a:extLst>
-              <a:ext uri="{FF2B5EF4-FFF2-40B4-BE49-F238E27FC236}">
-                <a16:creationId xmlns:a16="http://schemas.microsoft.com/office/drawing/2014/main" id="{C62A26E1-5FCA-48D6-B1C8-FAA19DEB0CCC}"/>
-              </a:ext>
-            </a:extLst>
-          </p:cNvPr>
-          <p:cNvPicPr>
-            <a:picLocks noChangeAspect="1" noChangeArrowheads="1"/>
-          </p:cNvPicPr>
-          <p:nvPr/>
-        </p:nvPicPr>
-        <p:blipFill>
-          <a:blip r:embed="rId4">
-            <a:extLst>
-              <a:ext uri="{28A0092B-C50C-407E-A947-70E740481C1C}">
-                <a14:useLocalDpi xmlns:a14="http://schemas.microsoft.com/office/drawing/2010/main" val="0"/>
-              </a:ext>
-            </a:extLst>
-          </a:blip>
-          <a:srcRect/>
-          <a:stretch>
-            <a:fillRect/>
-          </a:stretch>
-        </p:blipFill>
-        <p:spPr bwMode="auto">
-          <a:xfrm>
-            <a:off x="8271718" y="2601774"/>
-            <a:ext cx="3485901" cy="3744180"/>
-          </a:xfrm>
-          <a:prstGeom prst="rect">
-            <a:avLst/>
-          </a:prstGeom>
-          <a:noFill/>
-          <a:ln w="19050">
-            <a:solidFill>
-              <a:schemeClr val="tx1"/>
-            </a:solidFill>
-          </a:ln>
-          <a:extLst>
-            <a:ext uri="{909E8E84-426E-40DD-AFC4-6F175D3DCCD1}">
-              <a14:hiddenFill xmlns:a14="http://schemas.microsoft.com/office/drawing/2010/main">
-                <a:solidFill>
-                  <a:srgbClr val="FFFFFF"/>
-                </a:solidFill>
-              </a14:hiddenFill>
-            </a:ext>
-          </a:extLst>
-        </p:spPr>
-      </p:pic>
-      <p:sp>
-        <p:nvSpPr>
-          <p:cNvPr id="7" name="Content Placeholder 2">
-            <a:extLst>
-              <a:ext uri="{FF2B5EF4-FFF2-40B4-BE49-F238E27FC236}">
-                <a16:creationId xmlns:a16="http://schemas.microsoft.com/office/drawing/2014/main" id="{DC50EEA7-22B7-42C6-9FBF-0162CF435740}"/>
-              </a:ext>
-            </a:extLst>
-          </p:cNvPr>
-          <p:cNvSpPr>
-            <a:spLocks noGrp="1"/>
-          </p:cNvSpPr>
-          <p:nvPr>
-            <p:ph idx="1"/>
-          </p:nvPr>
-        </p:nvSpPr>
-        <p:spPr>
-          <a:xfrm>
-            <a:off x="318075" y="2118588"/>
-            <a:ext cx="11288697" cy="775532"/>
-          </a:xfrm>
-        </p:spPr>
-        <p:txBody>
-          <a:bodyPr>
-            <a:normAutofit/>
-          </a:bodyPr>
-          <a:lstStyle/>
-          <a:p>
-            <a:pPr marL="0" indent="0">
-              <a:buNone/>
-            </a:pPr>
-            <a:r>
-              <a:rPr lang="en-US" dirty="0"/>
-              <a:t>1) Microburst		     2) Background		        3) Ratio</a:t>
-            </a:r>
-          </a:p>
-        </p:txBody>
-      </p:sp>
     </p:spTree>
     <p:extLst>
       <p:ext uri="{BB962C8B-B14F-4D97-AF65-F5344CB8AC3E}">
@@ -5422,7 +5304,7 @@
         </p:blipFill>
         <p:spPr>
           <a:xfrm>
-            <a:off x="3652568" y="2496003"/>
+            <a:off x="3652568" y="2349555"/>
             <a:ext cx="4886864" cy="4024885"/>
           </a:xfrm>
           <a:prstGeom prst="rect">
@@ -5481,7 +5363,7 @@
         </p:nvSpPr>
         <p:spPr>
           <a:xfrm>
-            <a:off x="3652568" y="1923279"/>
+            <a:off x="3652568" y="1720471"/>
             <a:ext cx="5697411" cy="775532"/>
           </a:xfrm>
         </p:spPr>

</xml_diff>

<commit_message>
Updates to final report plots
</commit_message>
<xml_diff>
--- a/sampexlib/Concept Summaries/LASP Research Summary.pptx
+++ b/sampexlib/Concept Summaries/LASP Research Summary.pptx
@@ -269,7 +269,7 @@
           <a:p>
             <a:fld id="{4E9E4D5A-70D9-49DB-B396-8E67F4DFB91A}" type="datetimeFigureOut">
               <a:rPr lang="en-US" smtClean="0"/>
-              <a:t>11/19/2021</a:t>
+              <a:t>11/24/2021</a:t>
             </a:fld>
             <a:endParaRPr lang="en-US"/>
           </a:p>
@@ -467,7 +467,7 @@
           <a:p>
             <a:fld id="{4E9E4D5A-70D9-49DB-B396-8E67F4DFB91A}" type="datetimeFigureOut">
               <a:rPr lang="en-US" smtClean="0"/>
-              <a:t>11/19/2021</a:t>
+              <a:t>11/24/2021</a:t>
             </a:fld>
             <a:endParaRPr lang="en-US"/>
           </a:p>
@@ -675,7 +675,7 @@
           <a:p>
             <a:fld id="{4E9E4D5A-70D9-49DB-B396-8E67F4DFB91A}" type="datetimeFigureOut">
               <a:rPr lang="en-US" smtClean="0"/>
-              <a:t>11/19/2021</a:t>
+              <a:t>11/24/2021</a:t>
             </a:fld>
             <a:endParaRPr lang="en-US"/>
           </a:p>
@@ -873,7 +873,7 @@
           <a:p>
             <a:fld id="{4E9E4D5A-70D9-49DB-B396-8E67F4DFB91A}" type="datetimeFigureOut">
               <a:rPr lang="en-US" smtClean="0"/>
-              <a:t>11/19/2021</a:t>
+              <a:t>11/24/2021</a:t>
             </a:fld>
             <a:endParaRPr lang="en-US"/>
           </a:p>
@@ -1148,7 +1148,7 @@
           <a:p>
             <a:fld id="{4E9E4D5A-70D9-49DB-B396-8E67F4DFB91A}" type="datetimeFigureOut">
               <a:rPr lang="en-US" smtClean="0"/>
-              <a:t>11/19/2021</a:t>
+              <a:t>11/24/2021</a:t>
             </a:fld>
             <a:endParaRPr lang="en-US"/>
           </a:p>
@@ -1413,7 +1413,7 @@
           <a:p>
             <a:fld id="{4E9E4D5A-70D9-49DB-B396-8E67F4DFB91A}" type="datetimeFigureOut">
               <a:rPr lang="en-US" smtClean="0"/>
-              <a:t>11/19/2021</a:t>
+              <a:t>11/24/2021</a:t>
             </a:fld>
             <a:endParaRPr lang="en-US"/>
           </a:p>
@@ -1825,7 +1825,7 @@
           <a:p>
             <a:fld id="{4E9E4D5A-70D9-49DB-B396-8E67F4DFB91A}" type="datetimeFigureOut">
               <a:rPr lang="en-US" smtClean="0"/>
-              <a:t>11/19/2021</a:t>
+              <a:t>11/24/2021</a:t>
             </a:fld>
             <a:endParaRPr lang="en-US"/>
           </a:p>
@@ -1966,7 +1966,7 @@
           <a:p>
             <a:fld id="{4E9E4D5A-70D9-49DB-B396-8E67F4DFB91A}" type="datetimeFigureOut">
               <a:rPr lang="en-US" smtClean="0"/>
-              <a:t>11/19/2021</a:t>
+              <a:t>11/24/2021</a:t>
             </a:fld>
             <a:endParaRPr lang="en-US"/>
           </a:p>
@@ -2079,7 +2079,7 @@
           <a:p>
             <a:fld id="{4E9E4D5A-70D9-49DB-B396-8E67F4DFB91A}" type="datetimeFigureOut">
               <a:rPr lang="en-US" smtClean="0"/>
-              <a:t>11/19/2021</a:t>
+              <a:t>11/24/2021</a:t>
             </a:fld>
             <a:endParaRPr lang="en-US"/>
           </a:p>
@@ -2390,7 +2390,7 @@
           <a:p>
             <a:fld id="{4E9E4D5A-70D9-49DB-B396-8E67F4DFB91A}" type="datetimeFigureOut">
               <a:rPr lang="en-US" smtClean="0"/>
-              <a:t>11/19/2021</a:t>
+              <a:t>11/24/2021</a:t>
             </a:fld>
             <a:endParaRPr lang="en-US"/>
           </a:p>
@@ -2678,7 +2678,7 @@
           <a:p>
             <a:fld id="{4E9E4D5A-70D9-49DB-B396-8E67F4DFB91A}" type="datetimeFigureOut">
               <a:rPr lang="en-US" smtClean="0"/>
-              <a:t>11/19/2021</a:t>
+              <a:t>11/24/2021</a:t>
             </a:fld>
             <a:endParaRPr lang="en-US"/>
           </a:p>
@@ -2919,7 +2919,7 @@
           <a:p>
             <a:fld id="{4E9E4D5A-70D9-49DB-B396-8E67F4DFB91A}" type="datetimeFigureOut">
               <a:rPr lang="en-US" smtClean="0"/>
-              <a:t>11/19/2021</a:t>
+              <a:t>11/24/2021</a:t>
             </a:fld>
             <a:endParaRPr lang="en-US"/>
           </a:p>
@@ -4078,7 +4078,15 @@
             </a:pPr>
             <a:r>
               <a:rPr lang="en-US" sz="1400" dirty="0"/>
-              <a:t>Gyro motion</a:t>
+              <a:t>Gyro motion (~1 </a:t>
+            </a:r>
+            <a:r>
+              <a:rPr lang="en-US" sz="1400" dirty="0" err="1"/>
+              <a:t>ms</a:t>
+            </a:r>
+            <a:r>
+              <a:rPr lang="en-US" sz="1400" dirty="0"/>
+              <a:t>)</a:t>
             </a:r>
           </a:p>
           <a:p>
@@ -4087,7 +4095,7 @@
             </a:pPr>
             <a:r>
               <a:rPr lang="en-US" sz="1400" dirty="0"/>
-              <a:t>Bounce motion</a:t>
+              <a:t>Bounce motion (~0.1-1.0 s)</a:t>
             </a:r>
           </a:p>
           <a:p>
@@ -4096,7 +4104,7 @@
             </a:pPr>
             <a:r>
               <a:rPr lang="en-US" sz="1400" dirty="0"/>
-              <a:t>Drift motion</a:t>
+              <a:t>Drift motion (~1-10 min)</a:t>
             </a:r>
           </a:p>
           <a:p>
@@ -4389,8 +4397,8 @@
         </p:nvGrpSpPr>
         <p:grpSpPr>
           <a:xfrm>
-            <a:off x="2183907" y="3124941"/>
-            <a:ext cx="3052907" cy="3079468"/>
+            <a:off x="1975105" y="3124941"/>
+            <a:ext cx="3261710" cy="3079468"/>
             <a:chOff x="3089428" y="4324602"/>
             <a:chExt cx="2387083" cy="2250835"/>
           </a:xfrm>
@@ -4920,7 +4928,7 @@
             </a:pPr>
             <a:r>
               <a:rPr lang="en-US" dirty="0"/>
-              <a:t>Statistic year study of microburst occurrence and pitch angle isotropy normalized against the background electron population</a:t>
+              <a:t>Statistical year study of microburst occurrence and pitch angle isotropy normalized against the background electron population</a:t>
             </a:r>
           </a:p>
           <a:p>

</xml_diff>